<commit_message>
cifar100 transfer, pptx update
</commit_message>
<xml_diff>
--- a/paper/aics_ppp.pptx
+++ b/paper/aics_ppp.pptx
@@ -4,15 +4,30 @@
   <p:sldMasterIdLst>
     <p:sldMasterId id="2147483725" r:id="rId1"/>
   </p:sldMasterIdLst>
+  <p:handoutMasterIdLst>
+    <p:handoutMasterId r:id="rId22"/>
+  </p:handoutMasterIdLst>
   <p:sldIdLst>
     <p:sldId id="256" r:id="rId2"/>
     <p:sldId id="257" r:id="rId3"/>
     <p:sldId id="258" r:id="rId4"/>
-    <p:sldId id="259" r:id="rId5"/>
-    <p:sldId id="260" r:id="rId6"/>
-    <p:sldId id="261" r:id="rId7"/>
-    <p:sldId id="262" r:id="rId8"/>
-    <p:sldId id="263" r:id="rId9"/>
+    <p:sldId id="272" r:id="rId5"/>
+    <p:sldId id="259" r:id="rId6"/>
+    <p:sldId id="264" r:id="rId7"/>
+    <p:sldId id="271" r:id="rId8"/>
+    <p:sldId id="260" r:id="rId9"/>
+    <p:sldId id="266" r:id="rId10"/>
+    <p:sldId id="269" r:id="rId11"/>
+    <p:sldId id="270" r:id="rId12"/>
+    <p:sldId id="268" r:id="rId13"/>
+    <p:sldId id="267" r:id="rId14"/>
+    <p:sldId id="273" r:id="rId15"/>
+    <p:sldId id="261" r:id="rId16"/>
+    <p:sldId id="265" r:id="rId17"/>
+    <p:sldId id="274" r:id="rId18"/>
+    <p:sldId id="262" r:id="rId19"/>
+    <p:sldId id="275" r:id="rId20"/>
+    <p:sldId id="263" r:id="rId21"/>
   </p:sldIdLst>
   <p:sldSz cx="12192000" cy="6858000"/>
   <p:notesSz cx="6858000" cy="9144000"/>
@@ -114,6 +129,195 @@
 </p:presentation>
 </file>
 
+<file path=ppt/handoutMasters/handoutMaster1.xml><?xml version="1.0" encoding="utf-8"?>
+<p:handoutMaster xmlns:a="http://schemas.openxmlformats.org/drawingml/2006/main" xmlns:r="http://schemas.openxmlformats.org/officeDocument/2006/relationships" xmlns:p="http://schemas.openxmlformats.org/presentationml/2006/main">
+  <p:cSld>
+    <p:bg>
+      <p:bgRef idx="1001">
+        <a:schemeClr val="bg1"/>
+      </p:bgRef>
+    </p:bg>
+    <p:spTree>
+      <p:nvGrpSpPr>
+        <p:cNvPr id="1" name=""/>
+        <p:cNvGrpSpPr/>
+        <p:nvPr/>
+      </p:nvGrpSpPr>
+      <p:grpSpPr>
+        <a:xfrm>
+          <a:off x="0" y="0"/>
+          <a:ext cx="0" cy="0"/>
+          <a:chOff x="0" y="0"/>
+          <a:chExt cx="0" cy="0"/>
+        </a:xfrm>
+      </p:grpSpPr>
+      <p:sp>
+        <p:nvSpPr>
+          <p:cNvPr id="2" name="Header Placeholder 1">
+            <a:extLst>
+              <a:ext uri="{FF2B5EF4-FFF2-40B4-BE49-F238E27FC236}">
+                <a16:creationId xmlns:a16="http://schemas.microsoft.com/office/drawing/2014/main" id="{25CAAEF3-4A0D-A48A-9BB3-8772F2A2266A}"/>
+              </a:ext>
+            </a:extLst>
+          </p:cNvPr>
+          <p:cNvSpPr>
+            <a:spLocks noGrp="1"/>
+          </p:cNvSpPr>
+          <p:nvPr>
+            <p:ph type="hdr" sz="quarter"/>
+          </p:nvPr>
+        </p:nvSpPr>
+        <p:spPr>
+          <a:xfrm>
+            <a:off x="0" y="0"/>
+            <a:ext cx="2971800" cy="458788"/>
+          </a:xfrm>
+          <a:prstGeom prst="rect">
+            <a:avLst/>
+          </a:prstGeom>
+        </p:spPr>
+        <p:txBody>
+          <a:bodyPr vert="horz" lIns="91440" tIns="45720" rIns="91440" bIns="45720" rtlCol="0"/>
+          <a:lstStyle>
+            <a:lvl1pPr algn="l">
+              <a:defRPr sz="1200"/>
+            </a:lvl1pPr>
+          </a:lstStyle>
+          <a:p>
+            <a:endParaRPr lang="en-GB"/>
+          </a:p>
+        </p:txBody>
+      </p:sp>
+      <p:sp>
+        <p:nvSpPr>
+          <p:cNvPr id="3" name="Date Placeholder 2">
+            <a:extLst>
+              <a:ext uri="{FF2B5EF4-FFF2-40B4-BE49-F238E27FC236}">
+                <a16:creationId xmlns:a16="http://schemas.microsoft.com/office/drawing/2014/main" id="{C45E7F1C-F028-9DAD-B01B-F478DE6201D8}"/>
+              </a:ext>
+            </a:extLst>
+          </p:cNvPr>
+          <p:cNvSpPr>
+            <a:spLocks noGrp="1"/>
+          </p:cNvSpPr>
+          <p:nvPr>
+            <p:ph type="dt" sz="quarter" idx="1"/>
+          </p:nvPr>
+        </p:nvSpPr>
+        <p:spPr>
+          <a:xfrm>
+            <a:off x="3884613" y="0"/>
+            <a:ext cx="2971800" cy="458788"/>
+          </a:xfrm>
+          <a:prstGeom prst="rect">
+            <a:avLst/>
+          </a:prstGeom>
+        </p:spPr>
+        <p:txBody>
+          <a:bodyPr vert="horz" lIns="91440" tIns="45720" rIns="91440" bIns="45720" rtlCol="0"/>
+          <a:lstStyle>
+            <a:lvl1pPr algn="r">
+              <a:defRPr sz="1200"/>
+            </a:lvl1pPr>
+          </a:lstStyle>
+          <a:p>
+            <a:fld id="{3A7DEAA3-0C3D-E246-9DF9-3BDE564C14C8}" type="datetimeFigureOut">
+              <a:rPr lang="en-GB" smtClean="0"/>
+              <a:t>09/01/2025</a:t>
+            </a:fld>
+            <a:endParaRPr lang="en-GB"/>
+          </a:p>
+        </p:txBody>
+      </p:sp>
+      <p:sp>
+        <p:nvSpPr>
+          <p:cNvPr id="4" name="Footer Placeholder 3">
+            <a:extLst>
+              <a:ext uri="{FF2B5EF4-FFF2-40B4-BE49-F238E27FC236}">
+                <a16:creationId xmlns:a16="http://schemas.microsoft.com/office/drawing/2014/main" id="{696E164D-065C-D534-23D4-5EDEE54DCA0C}"/>
+              </a:ext>
+            </a:extLst>
+          </p:cNvPr>
+          <p:cNvSpPr>
+            <a:spLocks noGrp="1"/>
+          </p:cNvSpPr>
+          <p:nvPr>
+            <p:ph type="ftr" sz="quarter" idx="2"/>
+          </p:nvPr>
+        </p:nvSpPr>
+        <p:spPr>
+          <a:xfrm>
+            <a:off x="0" y="8685213"/>
+            <a:ext cx="2971800" cy="458787"/>
+          </a:xfrm>
+          <a:prstGeom prst="rect">
+            <a:avLst/>
+          </a:prstGeom>
+        </p:spPr>
+        <p:txBody>
+          <a:bodyPr vert="horz" lIns="91440" tIns="45720" rIns="91440" bIns="45720" rtlCol="0" anchor="b"/>
+          <a:lstStyle>
+            <a:lvl1pPr algn="l">
+              <a:defRPr sz="1200"/>
+            </a:lvl1pPr>
+          </a:lstStyle>
+          <a:p>
+            <a:endParaRPr lang="en-GB"/>
+          </a:p>
+        </p:txBody>
+      </p:sp>
+      <p:sp>
+        <p:nvSpPr>
+          <p:cNvPr id="5" name="Slide Number Placeholder 4">
+            <a:extLst>
+              <a:ext uri="{FF2B5EF4-FFF2-40B4-BE49-F238E27FC236}">
+                <a16:creationId xmlns:a16="http://schemas.microsoft.com/office/drawing/2014/main" id="{4B4E4ECB-7AAC-A1D9-45D5-7202AFA985C2}"/>
+              </a:ext>
+            </a:extLst>
+          </p:cNvPr>
+          <p:cNvSpPr>
+            <a:spLocks noGrp="1"/>
+          </p:cNvSpPr>
+          <p:nvPr>
+            <p:ph type="sldNum" sz="quarter" idx="3"/>
+          </p:nvPr>
+        </p:nvSpPr>
+        <p:spPr>
+          <a:xfrm>
+            <a:off x="3884613" y="8685213"/>
+            <a:ext cx="2971800" cy="458787"/>
+          </a:xfrm>
+          <a:prstGeom prst="rect">
+            <a:avLst/>
+          </a:prstGeom>
+        </p:spPr>
+        <p:txBody>
+          <a:bodyPr vert="horz" lIns="91440" tIns="45720" rIns="91440" bIns="45720" rtlCol="0" anchor="b"/>
+          <a:lstStyle>
+            <a:lvl1pPr algn="r">
+              <a:defRPr sz="1200"/>
+            </a:lvl1pPr>
+          </a:lstStyle>
+          <a:p>
+            <a:fld id="{32EDE040-D790-5A4E-A8AA-834161656404}" type="slidenum">
+              <a:rPr lang="en-GB" smtClean="0"/>
+              <a:t>‹#›</a:t>
+            </a:fld>
+            <a:endParaRPr lang="en-GB"/>
+          </a:p>
+        </p:txBody>
+      </p:sp>
+    </p:spTree>
+    <p:extLst>
+      <p:ext uri="{BB962C8B-B14F-4D97-AF65-F5344CB8AC3E}">
+        <p14:creationId xmlns:p14="http://schemas.microsoft.com/office/powerpoint/2010/main" val="2615679233"/>
+      </p:ext>
+    </p:extLst>
+  </p:cSld>
+  <p:clrMap bg1="lt1" tx1="dk1" bg2="lt2" tx2="dk2" accent1="accent1" accent2="accent2" accent3="accent3" accent4="accent4" accent5="accent5" accent6="accent6" hlink="hlink" folHlink="folHlink"/>
+</p:handoutMaster>
+</file>
+
 <file path=ppt/slideLayouts/slideLayout1.xml><?xml version="1.0" encoding="utf-8"?>
 <p:sldLayout xmlns:a="http://schemas.openxmlformats.org/drawingml/2006/main" xmlns:r="http://schemas.openxmlformats.org/officeDocument/2006/relationships" xmlns:p="http://schemas.openxmlformats.org/presentationml/2006/main" type="title" preserve="1">
   <p:cSld name="Title Slide">
@@ -1052,43 +1256,60 @@
           </a:xfrm>
         </p:spPr>
         <p:txBody>
-          <a:bodyPr/>
-          <a:lstStyle/>
+          <a:bodyPr>
+            <a:normAutofit/>
+          </a:bodyPr>
+          <a:lstStyle>
+            <a:lvl1pPr>
+              <a:defRPr sz="2400"/>
+            </a:lvl1pPr>
+            <a:lvl2pPr>
+              <a:defRPr sz="2000"/>
+            </a:lvl2pPr>
+            <a:lvl3pPr>
+              <a:defRPr sz="1800"/>
+            </a:lvl3pPr>
+            <a:lvl4pPr>
+              <a:defRPr sz="1600"/>
+            </a:lvl4pPr>
+            <a:lvl5pPr>
+              <a:defRPr sz="1600"/>
+            </a:lvl5pPr>
+          </a:lstStyle>
           <a:p>
             <a:pPr lvl="0"/>
             <a:r>
-              <a:rPr lang="en-US"/>
+              <a:rPr lang="en-US" dirty="0"/>
               <a:t>Click to edit Master text styles</a:t>
             </a:r>
           </a:p>
           <a:p>
             <a:pPr lvl="1"/>
             <a:r>
-              <a:rPr lang="en-US"/>
+              <a:rPr lang="en-US" dirty="0"/>
               <a:t>Second level</a:t>
             </a:r>
           </a:p>
           <a:p>
             <a:pPr lvl="2"/>
             <a:r>
-              <a:rPr lang="en-US"/>
+              <a:rPr lang="en-US" dirty="0"/>
               <a:t>Third level</a:t>
             </a:r>
           </a:p>
           <a:p>
             <a:pPr lvl="3"/>
             <a:r>
-              <a:rPr lang="en-US"/>
+              <a:rPr lang="en-US" dirty="0"/>
               <a:t>Fourth level</a:t>
             </a:r>
           </a:p>
           <a:p>
             <a:pPr lvl="4"/>
             <a:r>
-              <a:rPr lang="en-US"/>
+              <a:rPr lang="en-US" dirty="0"/>
               <a:t>Fifth level</a:t>
             </a:r>
-            <a:endParaRPr lang="en-US" dirty="0"/>
           </a:p>
         </p:txBody>
       </p:sp>
@@ -3100,10 +3321,9 @@
           <a:lstStyle/>
           <a:p>
             <a:r>
-              <a:rPr lang="en-US"/>
+              <a:rPr lang="en-US" dirty="0"/>
               <a:t>Click to edit Master title style</a:t>
             </a:r>
-            <a:endParaRPr lang="en-US" dirty="0"/>
           </a:p>
         </p:txBody>
       </p:sp>
@@ -3134,38 +3354,37 @@
           <a:p>
             <a:pPr lvl="0"/>
             <a:r>
-              <a:rPr lang="en-US"/>
+              <a:rPr lang="en-US" dirty="0"/>
               <a:t>Click to edit Master text styles</a:t>
             </a:r>
           </a:p>
           <a:p>
             <a:pPr lvl="1"/>
             <a:r>
-              <a:rPr lang="en-US"/>
+              <a:rPr lang="en-US" dirty="0"/>
               <a:t>Second level</a:t>
             </a:r>
           </a:p>
           <a:p>
             <a:pPr lvl="2"/>
             <a:r>
-              <a:rPr lang="en-US"/>
+              <a:rPr lang="en-US" dirty="0"/>
               <a:t>Third level</a:t>
             </a:r>
           </a:p>
           <a:p>
             <a:pPr lvl="3"/>
             <a:r>
-              <a:rPr lang="en-US"/>
+              <a:rPr lang="en-US" dirty="0"/>
               <a:t>Fourth level</a:t>
             </a:r>
           </a:p>
           <a:p>
             <a:pPr lvl="4"/>
             <a:r>
-              <a:rPr lang="en-US"/>
+              <a:rPr lang="en-US" dirty="0"/>
               <a:t>Fifth level</a:t>
             </a:r>
-            <a:endParaRPr lang="en-US" dirty="0"/>
           </a:p>
         </p:txBody>
       </p:sp>
@@ -3434,7 +3653,7 @@
           <a:spcPct val="0"/>
         </a:spcBef>
         <a:buNone/>
-        <a:defRPr sz="2800" b="0" kern="1200" cap="all">
+        <a:defRPr sz="3200" b="0" kern="1200" cap="all">
           <a:solidFill>
             <a:schemeClr val="tx1">
               <a:lumMod val="75000"/>
@@ -3520,7 +3739,7 @@
         <a:buSzPct val="92000"/>
         <a:buFont typeface="Wingdings 2" panose="05020102010507070707" pitchFamily="18" charset="2"/>
         <a:buChar char=""/>
-        <a:defRPr sz="1800" kern="1200">
+        <a:defRPr sz="2800" kern="1200">
           <a:solidFill>
             <a:schemeClr val="tx1">
               <a:lumMod val="75000"/>
@@ -3548,7 +3767,7 @@
         <a:buSzPct val="92000"/>
         <a:buFont typeface="Wingdings 2" panose="05020102010507070707" pitchFamily="18" charset="2"/>
         <a:buChar char=""/>
-        <a:defRPr sz="1600" kern="1200">
+        <a:defRPr sz="2400" kern="1200">
           <a:solidFill>
             <a:schemeClr val="tx1">
               <a:lumMod val="75000"/>
@@ -3576,7 +3795,7 @@
         <a:buSzPct val="92000"/>
         <a:buFont typeface="Wingdings 2" panose="05020102010507070707" pitchFamily="18" charset="2"/>
         <a:buChar char=""/>
-        <a:defRPr sz="1400" kern="1200">
+        <a:defRPr sz="2000" kern="1200">
           <a:solidFill>
             <a:schemeClr val="tx1">
               <a:lumMod val="75000"/>
@@ -3604,7 +3823,7 @@
         <a:buSzPct val="92000"/>
         <a:buFont typeface="Wingdings 2" panose="05020102010507070707" pitchFamily="18" charset="2"/>
         <a:buChar char=""/>
-        <a:defRPr sz="1200" kern="1200">
+        <a:defRPr sz="1800" kern="1200">
           <a:solidFill>
             <a:schemeClr val="tx1">
               <a:lumMod val="75000"/>
@@ -3632,7 +3851,7 @@
         <a:buSzPct val="92000"/>
         <a:buFont typeface="Wingdings 2" panose="05020102010507070707" pitchFamily="18" charset="2"/>
         <a:buChar char=""/>
-        <a:defRPr sz="1200" kern="1200">
+        <a:defRPr sz="1800" kern="1200">
           <a:solidFill>
             <a:schemeClr val="tx1">
               <a:lumMod val="75000"/>
@@ -4261,6 +4480,2286 @@
 </p:sld>
 </file>
 
+<file path=ppt/slides/slide10.xml><?xml version="1.0" encoding="utf-8"?>
+<p:sld xmlns:a="http://schemas.openxmlformats.org/drawingml/2006/main" xmlns:r="http://schemas.openxmlformats.org/officeDocument/2006/relationships" xmlns:p="http://schemas.openxmlformats.org/presentationml/2006/main">
+  <p:cSld>
+    <p:spTree>
+      <p:nvGrpSpPr>
+        <p:cNvPr id="1" name="">
+          <a:extLst>
+            <a:ext uri="{FF2B5EF4-FFF2-40B4-BE49-F238E27FC236}">
+              <a16:creationId xmlns:a16="http://schemas.microsoft.com/office/drawing/2014/main" id="{C154ABBC-FEFD-C0C3-CAF9-74DAFB60CC14}"/>
+            </a:ext>
+          </a:extLst>
+        </p:cNvPr>
+        <p:cNvGrpSpPr/>
+        <p:nvPr/>
+      </p:nvGrpSpPr>
+      <p:grpSpPr>
+        <a:xfrm>
+          <a:off x="0" y="0"/>
+          <a:ext cx="0" cy="0"/>
+          <a:chOff x="0" y="0"/>
+          <a:chExt cx="0" cy="0"/>
+        </a:xfrm>
+      </p:grpSpPr>
+      <p:sp>
+        <p:nvSpPr>
+          <p:cNvPr id="2" name="Title 1">
+            <a:extLst>
+              <a:ext uri="{FF2B5EF4-FFF2-40B4-BE49-F238E27FC236}">
+                <a16:creationId xmlns:a16="http://schemas.microsoft.com/office/drawing/2014/main" id="{9395EBC2-D26D-F17D-D6D5-C66F6719495E}"/>
+              </a:ext>
+            </a:extLst>
+          </p:cNvPr>
+          <p:cNvSpPr>
+            <a:spLocks noGrp="1"/>
+          </p:cNvSpPr>
+          <p:nvPr>
+            <p:ph type="title"/>
+          </p:nvPr>
+        </p:nvSpPr>
+        <p:spPr/>
+        <p:txBody>
+          <a:bodyPr/>
+          <a:lstStyle/>
+          <a:p>
+            <a:r>
+              <a:rPr lang="en-GB" dirty="0"/>
+              <a:t>Methods</a:t>
+            </a:r>
+            <a:br>
+              <a:rPr lang="en-GB" dirty="0"/>
+            </a:br>
+            <a:r>
+              <a:rPr lang="en-GB" sz="2800" b="1" dirty="0"/>
+              <a:t>1) Binary Image classification</a:t>
+            </a:r>
+            <a:endParaRPr lang="en-GB" b="1" dirty="0"/>
+          </a:p>
+        </p:txBody>
+      </p:sp>
+      <p:sp>
+        <p:nvSpPr>
+          <p:cNvPr id="3" name="Content Placeholder 2">
+            <a:extLst>
+              <a:ext uri="{FF2B5EF4-FFF2-40B4-BE49-F238E27FC236}">
+                <a16:creationId xmlns:a16="http://schemas.microsoft.com/office/drawing/2014/main" id="{F0900DCA-EB10-80C7-B251-1C180D16E9AE}"/>
+              </a:ext>
+            </a:extLst>
+          </p:cNvPr>
+          <p:cNvSpPr>
+            <a:spLocks noGrp="1"/>
+          </p:cNvSpPr>
+          <p:nvPr>
+            <p:ph idx="1"/>
+          </p:nvPr>
+        </p:nvSpPr>
+        <p:spPr/>
+        <p:txBody>
+          <a:bodyPr anchor="t">
+            <a:normAutofit/>
+          </a:bodyPr>
+          <a:lstStyle/>
+          <a:p>
+            <a:pPr marL="514350" indent="-514350">
+              <a:buFont typeface="+mj-lt"/>
+              <a:buAutoNum type="alphaUcPeriod"/>
+            </a:pPr>
+            <a:r>
+              <a:rPr lang="en-GB" sz="2800" dirty="0"/>
+              <a:t>Performance on CIFAKE, task difficulty</a:t>
+            </a:r>
+          </a:p>
+          <a:p>
+            <a:pPr lvl="1"/>
+            <a:r>
+              <a:rPr lang="en-GB" sz="2400" dirty="0"/>
+              <a:t>Train CNN based on cifar10_tutorial.ipynb (modified for binary classification)</a:t>
+            </a:r>
+          </a:p>
+          <a:p>
+            <a:pPr lvl="1"/>
+            <a:r>
+              <a:rPr lang="en-GB" sz="2400" dirty="0"/>
+              <a:t>[architecture]</a:t>
+            </a:r>
+          </a:p>
+        </p:txBody>
+      </p:sp>
+    </p:spTree>
+    <p:extLst>
+      <p:ext uri="{BB962C8B-B14F-4D97-AF65-F5344CB8AC3E}">
+        <p14:creationId xmlns:p14="http://schemas.microsoft.com/office/powerpoint/2010/main" val="2092725469"/>
+      </p:ext>
+    </p:extLst>
+  </p:cSld>
+  <p:clrMapOvr>
+    <a:masterClrMapping/>
+  </p:clrMapOvr>
+</p:sld>
+</file>
+
+<file path=ppt/slides/slide11.xml><?xml version="1.0" encoding="utf-8"?>
+<p:sld xmlns:a="http://schemas.openxmlformats.org/drawingml/2006/main" xmlns:r="http://schemas.openxmlformats.org/officeDocument/2006/relationships" xmlns:p="http://schemas.openxmlformats.org/presentationml/2006/main">
+  <p:cSld>
+    <p:spTree>
+      <p:nvGrpSpPr>
+        <p:cNvPr id="1" name="">
+          <a:extLst>
+            <a:ext uri="{FF2B5EF4-FFF2-40B4-BE49-F238E27FC236}">
+              <a16:creationId xmlns:a16="http://schemas.microsoft.com/office/drawing/2014/main" id="{B9ABAD43-F203-D8C3-3083-AC03742E9F1F}"/>
+            </a:ext>
+          </a:extLst>
+        </p:cNvPr>
+        <p:cNvGrpSpPr/>
+        <p:nvPr/>
+      </p:nvGrpSpPr>
+      <p:grpSpPr>
+        <a:xfrm>
+          <a:off x="0" y="0"/>
+          <a:ext cx="0" cy="0"/>
+          <a:chOff x="0" y="0"/>
+          <a:chExt cx="0" cy="0"/>
+        </a:xfrm>
+      </p:grpSpPr>
+      <p:sp>
+        <p:nvSpPr>
+          <p:cNvPr id="2" name="Title 1">
+            <a:extLst>
+              <a:ext uri="{FF2B5EF4-FFF2-40B4-BE49-F238E27FC236}">
+                <a16:creationId xmlns:a16="http://schemas.microsoft.com/office/drawing/2014/main" id="{FD9FD8FC-1DEA-F422-5F8C-D78047CFCEEC}"/>
+              </a:ext>
+            </a:extLst>
+          </p:cNvPr>
+          <p:cNvSpPr>
+            <a:spLocks noGrp="1"/>
+          </p:cNvSpPr>
+          <p:nvPr>
+            <p:ph type="title"/>
+          </p:nvPr>
+        </p:nvSpPr>
+        <p:spPr/>
+        <p:txBody>
+          <a:bodyPr/>
+          <a:lstStyle/>
+          <a:p>
+            <a:r>
+              <a:rPr lang="en-GB" dirty="0"/>
+              <a:t>Methods</a:t>
+            </a:r>
+            <a:br>
+              <a:rPr lang="en-GB" dirty="0"/>
+            </a:br>
+            <a:r>
+              <a:rPr lang="en-GB" sz="2800" b="1" dirty="0"/>
+              <a:t>1) Binary Image classification</a:t>
+            </a:r>
+            <a:endParaRPr lang="en-GB" b="1" dirty="0"/>
+          </a:p>
+        </p:txBody>
+      </p:sp>
+      <p:sp>
+        <p:nvSpPr>
+          <p:cNvPr id="3" name="Content Placeholder 2">
+            <a:extLst>
+              <a:ext uri="{FF2B5EF4-FFF2-40B4-BE49-F238E27FC236}">
+                <a16:creationId xmlns:a16="http://schemas.microsoft.com/office/drawing/2014/main" id="{5D4F5BD8-E53F-9191-3434-55D96330B105}"/>
+              </a:ext>
+            </a:extLst>
+          </p:cNvPr>
+          <p:cNvSpPr>
+            <a:spLocks noGrp="1"/>
+          </p:cNvSpPr>
+          <p:nvPr>
+            <p:ph idx="1"/>
+          </p:nvPr>
+        </p:nvSpPr>
+        <p:spPr/>
+        <p:txBody>
+          <a:bodyPr anchor="t">
+            <a:normAutofit/>
+          </a:bodyPr>
+          <a:lstStyle/>
+          <a:p>
+            <a:pPr marL="514350" indent="-514350">
+              <a:buFont typeface="+mj-lt"/>
+              <a:buAutoNum type="alphaUcPeriod"/>
+            </a:pPr>
+            <a:r>
+              <a:rPr lang="en-GB" sz="2800" dirty="0"/>
+              <a:t>Performance on CIFAKE, task difficulty</a:t>
+            </a:r>
+          </a:p>
+          <a:p>
+            <a:pPr lvl="1"/>
+            <a:r>
+              <a:rPr lang="en-GB" sz="2400" dirty="0"/>
+              <a:t>Train CNN based on cifar10_tutorial.ipynb (modified for binary classification)</a:t>
+            </a:r>
+          </a:p>
+          <a:p>
+            <a:pPr lvl="1"/>
+            <a:r>
+              <a:rPr lang="en-GB" sz="2400" dirty="0"/>
+              <a:t>Explore threshold size effect</a:t>
+            </a:r>
+          </a:p>
+        </p:txBody>
+      </p:sp>
+    </p:spTree>
+    <p:extLst>
+      <p:ext uri="{BB962C8B-B14F-4D97-AF65-F5344CB8AC3E}">
+        <p14:creationId xmlns:p14="http://schemas.microsoft.com/office/powerpoint/2010/main" val="1509742935"/>
+      </p:ext>
+    </p:extLst>
+  </p:cSld>
+  <p:clrMapOvr>
+    <a:masterClrMapping/>
+  </p:clrMapOvr>
+</p:sld>
+</file>
+
+<file path=ppt/slides/slide12.xml><?xml version="1.0" encoding="utf-8"?>
+<p:sld xmlns:a="http://schemas.openxmlformats.org/drawingml/2006/main" xmlns:r="http://schemas.openxmlformats.org/officeDocument/2006/relationships" xmlns:p="http://schemas.openxmlformats.org/presentationml/2006/main">
+  <p:cSld>
+    <p:spTree>
+      <p:nvGrpSpPr>
+        <p:cNvPr id="1" name="">
+          <a:extLst>
+            <a:ext uri="{FF2B5EF4-FFF2-40B4-BE49-F238E27FC236}">
+              <a16:creationId xmlns:a16="http://schemas.microsoft.com/office/drawing/2014/main" id="{E6D20741-33F8-BF96-A2E3-AD4EC20CE857}"/>
+            </a:ext>
+          </a:extLst>
+        </p:cNvPr>
+        <p:cNvGrpSpPr/>
+        <p:nvPr/>
+      </p:nvGrpSpPr>
+      <p:grpSpPr>
+        <a:xfrm>
+          <a:off x="0" y="0"/>
+          <a:ext cx="0" cy="0"/>
+          <a:chOff x="0" y="0"/>
+          <a:chExt cx="0" cy="0"/>
+        </a:xfrm>
+      </p:grpSpPr>
+      <p:sp>
+        <p:nvSpPr>
+          <p:cNvPr id="2" name="Title 1">
+            <a:extLst>
+              <a:ext uri="{FF2B5EF4-FFF2-40B4-BE49-F238E27FC236}">
+                <a16:creationId xmlns:a16="http://schemas.microsoft.com/office/drawing/2014/main" id="{4B0AB1B9-D75C-8444-EA9B-BE4B6C626DC5}"/>
+              </a:ext>
+            </a:extLst>
+          </p:cNvPr>
+          <p:cNvSpPr>
+            <a:spLocks noGrp="1"/>
+          </p:cNvSpPr>
+          <p:nvPr>
+            <p:ph type="title"/>
+          </p:nvPr>
+        </p:nvSpPr>
+        <p:spPr/>
+        <p:txBody>
+          <a:bodyPr/>
+          <a:lstStyle/>
+          <a:p>
+            <a:r>
+              <a:rPr lang="en-GB" dirty="0"/>
+              <a:t>Methods</a:t>
+            </a:r>
+            <a:br>
+              <a:rPr lang="en-GB" dirty="0"/>
+            </a:br>
+            <a:r>
+              <a:rPr lang="en-GB" sz="2800" b="1" dirty="0"/>
+              <a:t>1) Binary Image classification</a:t>
+            </a:r>
+            <a:endParaRPr lang="en-GB" b="1" dirty="0"/>
+          </a:p>
+        </p:txBody>
+      </p:sp>
+      <p:sp>
+        <p:nvSpPr>
+          <p:cNvPr id="3" name="Content Placeholder 2">
+            <a:extLst>
+              <a:ext uri="{FF2B5EF4-FFF2-40B4-BE49-F238E27FC236}">
+                <a16:creationId xmlns:a16="http://schemas.microsoft.com/office/drawing/2014/main" id="{7A3923F3-32C0-1A29-24B9-565156D5A747}"/>
+              </a:ext>
+            </a:extLst>
+          </p:cNvPr>
+          <p:cNvSpPr>
+            <a:spLocks noGrp="1"/>
+          </p:cNvSpPr>
+          <p:nvPr>
+            <p:ph idx="1"/>
+          </p:nvPr>
+        </p:nvSpPr>
+        <p:spPr/>
+        <p:txBody>
+          <a:bodyPr anchor="t">
+            <a:normAutofit/>
+          </a:bodyPr>
+          <a:lstStyle/>
+          <a:p>
+            <a:pPr marL="514350" indent="-514350">
+              <a:buFont typeface="+mj-lt"/>
+              <a:buAutoNum type="alphaUcPeriod" startAt="2"/>
+            </a:pPr>
+            <a:r>
+              <a:rPr lang="en-GB" sz="2800" dirty="0"/>
+              <a:t>Suitability of channel attention: SRM</a:t>
+            </a:r>
+          </a:p>
+          <a:p>
+            <a:pPr lvl="1"/>
+            <a:r>
+              <a:rPr lang="en-GB" sz="2400" dirty="0"/>
+              <a:t>Style-Recalibration Module (SIC!)</a:t>
+            </a:r>
+          </a:p>
+        </p:txBody>
+      </p:sp>
+    </p:spTree>
+    <p:extLst>
+      <p:ext uri="{BB962C8B-B14F-4D97-AF65-F5344CB8AC3E}">
+        <p14:creationId xmlns:p14="http://schemas.microsoft.com/office/powerpoint/2010/main" val="3580880043"/>
+      </p:ext>
+    </p:extLst>
+  </p:cSld>
+  <p:clrMapOvr>
+    <a:masterClrMapping/>
+  </p:clrMapOvr>
+</p:sld>
+</file>
+
+<file path=ppt/slides/slide13.xml><?xml version="1.0" encoding="utf-8"?>
+<p:sld xmlns:a="http://schemas.openxmlformats.org/drawingml/2006/main" xmlns:r="http://schemas.openxmlformats.org/officeDocument/2006/relationships" xmlns:p="http://schemas.openxmlformats.org/presentationml/2006/main">
+  <p:cSld>
+    <p:spTree>
+      <p:nvGrpSpPr>
+        <p:cNvPr id="1" name="">
+          <a:extLst>
+            <a:ext uri="{FF2B5EF4-FFF2-40B4-BE49-F238E27FC236}">
+              <a16:creationId xmlns:a16="http://schemas.microsoft.com/office/drawing/2014/main" id="{F6C48057-BA46-AADE-0BEF-534FE1B517E8}"/>
+            </a:ext>
+          </a:extLst>
+        </p:cNvPr>
+        <p:cNvGrpSpPr/>
+        <p:nvPr/>
+      </p:nvGrpSpPr>
+      <p:grpSpPr>
+        <a:xfrm>
+          <a:off x="0" y="0"/>
+          <a:ext cx="0" cy="0"/>
+          <a:chOff x="0" y="0"/>
+          <a:chExt cx="0" cy="0"/>
+        </a:xfrm>
+      </p:grpSpPr>
+      <p:sp>
+        <p:nvSpPr>
+          <p:cNvPr id="2" name="Title 1">
+            <a:extLst>
+              <a:ext uri="{FF2B5EF4-FFF2-40B4-BE49-F238E27FC236}">
+                <a16:creationId xmlns:a16="http://schemas.microsoft.com/office/drawing/2014/main" id="{BCB36B44-AEBB-3953-BF3A-EF9E9CA04786}"/>
+              </a:ext>
+            </a:extLst>
+          </p:cNvPr>
+          <p:cNvSpPr>
+            <a:spLocks noGrp="1"/>
+          </p:cNvSpPr>
+          <p:nvPr>
+            <p:ph type="title"/>
+          </p:nvPr>
+        </p:nvSpPr>
+        <p:spPr/>
+        <p:txBody>
+          <a:bodyPr/>
+          <a:lstStyle/>
+          <a:p>
+            <a:r>
+              <a:rPr lang="en-GB" dirty="0"/>
+              <a:t>Methods</a:t>
+            </a:r>
+            <a:br>
+              <a:rPr lang="en-GB" dirty="0"/>
+            </a:br>
+            <a:r>
+              <a:rPr lang="en-GB" sz="2800" b="1" dirty="0"/>
+              <a:t>2) </a:t>
+            </a:r>
+            <a:r>
+              <a:rPr lang="en-GB" sz="2800" b="1" dirty="0" err="1"/>
+              <a:t>TRAnsfer</a:t>
+            </a:r>
+            <a:endParaRPr lang="en-GB" b="1" dirty="0"/>
+          </a:p>
+        </p:txBody>
+      </p:sp>
+      <p:sp>
+        <p:nvSpPr>
+          <p:cNvPr id="3" name="Content Placeholder 2">
+            <a:extLst>
+              <a:ext uri="{FF2B5EF4-FFF2-40B4-BE49-F238E27FC236}">
+                <a16:creationId xmlns:a16="http://schemas.microsoft.com/office/drawing/2014/main" id="{0EEFA31C-3FB8-C64E-714C-3162754FD790}"/>
+              </a:ext>
+            </a:extLst>
+          </p:cNvPr>
+          <p:cNvSpPr>
+            <a:spLocks noGrp="1"/>
+          </p:cNvSpPr>
+          <p:nvPr>
+            <p:ph idx="1"/>
+          </p:nvPr>
+        </p:nvSpPr>
+        <p:spPr/>
+        <p:txBody>
+          <a:bodyPr>
+            <a:normAutofit/>
+          </a:bodyPr>
+          <a:lstStyle/>
+          <a:p>
+            <a:pPr marL="514350" indent="-514350">
+              <a:buFont typeface="+mj-lt"/>
+              <a:buAutoNum type="alphaUcPeriod"/>
+            </a:pPr>
+            <a:r>
+              <a:rPr lang="en-GB" sz="2800" dirty="0"/>
+              <a:t>On real images (similar style; cifar100)</a:t>
+            </a:r>
+          </a:p>
+          <a:p>
+            <a:pPr lvl="1"/>
+            <a:r>
+              <a:rPr lang="en-GB" sz="2400" dirty="0"/>
+              <a:t>False neg rate?</a:t>
+            </a:r>
+          </a:p>
+          <a:p>
+            <a:pPr marL="514350" indent="-514350">
+              <a:buFont typeface="+mj-lt"/>
+              <a:buAutoNum type="alphaUcPeriod"/>
+            </a:pPr>
+            <a:r>
+              <a:rPr lang="en-GB" sz="2800" dirty="0"/>
+              <a:t>On fake images (TBD)</a:t>
+            </a:r>
+          </a:p>
+        </p:txBody>
+      </p:sp>
+    </p:spTree>
+    <p:extLst>
+      <p:ext uri="{BB962C8B-B14F-4D97-AF65-F5344CB8AC3E}">
+        <p14:creationId xmlns:p14="http://schemas.microsoft.com/office/powerpoint/2010/main" val="2670222917"/>
+      </p:ext>
+    </p:extLst>
+  </p:cSld>
+  <p:clrMapOvr>
+    <a:masterClrMapping/>
+  </p:clrMapOvr>
+</p:sld>
+</file>
+
+<file path=ppt/slides/slide14.xml><?xml version="1.0" encoding="utf-8"?>
+<p:sld xmlns:a="http://schemas.openxmlformats.org/drawingml/2006/main" xmlns:r="http://schemas.openxmlformats.org/officeDocument/2006/relationships" xmlns:p="http://schemas.openxmlformats.org/presentationml/2006/main">
+  <p:cSld>
+    <p:bg>
+      <p:bgPr>
+        <a:solidFill>
+          <a:schemeClr val="bg2"/>
+        </a:solidFill>
+        <a:effectLst/>
+      </p:bgPr>
+    </p:bg>
+    <p:spTree>
+      <p:nvGrpSpPr>
+        <p:cNvPr id="1" name="">
+          <a:extLst>
+            <a:ext uri="{FF2B5EF4-FFF2-40B4-BE49-F238E27FC236}">
+              <a16:creationId xmlns:a16="http://schemas.microsoft.com/office/drawing/2014/main" id="{D84BB093-5F1B-9F9F-931A-B563950887F9}"/>
+            </a:ext>
+          </a:extLst>
+        </p:cNvPr>
+        <p:cNvGrpSpPr/>
+        <p:nvPr/>
+      </p:nvGrpSpPr>
+      <p:grpSpPr>
+        <a:xfrm>
+          <a:off x="0" y="0"/>
+          <a:ext cx="0" cy="0"/>
+          <a:chOff x="0" y="0"/>
+          <a:chExt cx="0" cy="0"/>
+        </a:xfrm>
+      </p:grpSpPr>
+      <p:sp>
+        <p:nvSpPr>
+          <p:cNvPr id="8" name="Rectangle 7">
+            <a:extLst>
+              <a:ext uri="{FF2B5EF4-FFF2-40B4-BE49-F238E27FC236}">
+                <a16:creationId xmlns:a16="http://schemas.microsoft.com/office/drawing/2014/main" id="{757F1774-6A59-F160-C756-C94B8C8FB042}"/>
+              </a:ext>
+              <a:ext uri="{C183D7F6-B498-43B3-948B-1728B52AA6E4}">
+                <adec:decorative xmlns:adec="http://schemas.microsoft.com/office/drawing/2017/decorative" val="1"/>
+              </a:ext>
+            </a:extLst>
+          </p:cNvPr>
+          <p:cNvSpPr>
+            <a:spLocks noGrp="1" noRot="1" noChangeAspect="1" noMove="1" noResize="1" noEditPoints="1" noAdjustHandles="1" noChangeArrowheads="1" noChangeShapeType="1" noTextEdit="1"/>
+          </p:cNvSpPr>
+          <p:nvPr>
+            <p:extLst>
+              <p:ext uri="{386F3935-93C4-4BCD-93E2-E3B085C9AB24}">
+                <p16:designElem xmlns:p16="http://schemas.microsoft.com/office/powerpoint/2015/main" val="1"/>
+              </p:ext>
+            </p:extLst>
+          </p:nvPr>
+        </p:nvSpPr>
+        <p:spPr>
+          <a:xfrm>
+            <a:off x="446534" y="457200"/>
+            <a:ext cx="3703320" cy="94997"/>
+          </a:xfrm>
+          <a:prstGeom prst="rect">
+            <a:avLst/>
+          </a:prstGeom>
+          <a:solidFill>
+            <a:srgbClr val="465359"/>
+          </a:solidFill>
+          <a:ln>
+            <a:noFill/>
+          </a:ln>
+          <a:effectLst/>
+        </p:spPr>
+        <p:style>
+          <a:lnRef idx="1">
+            <a:schemeClr val="accent1"/>
+          </a:lnRef>
+          <a:fillRef idx="3">
+            <a:schemeClr val="accent1"/>
+          </a:fillRef>
+          <a:effectRef idx="2">
+            <a:schemeClr val="accent1"/>
+          </a:effectRef>
+          <a:fontRef idx="minor">
+            <a:schemeClr val="lt1"/>
+          </a:fontRef>
+        </p:style>
+        <p:txBody>
+          <a:bodyPr/>
+          <a:lstStyle/>
+          <a:p>
+            <a:endParaRPr lang="en-GB"/>
+          </a:p>
+        </p:txBody>
+      </p:sp>
+      <p:sp>
+        <p:nvSpPr>
+          <p:cNvPr id="10" name="Rectangle 9">
+            <a:extLst>
+              <a:ext uri="{FF2B5EF4-FFF2-40B4-BE49-F238E27FC236}">
+                <a16:creationId xmlns:a16="http://schemas.microsoft.com/office/drawing/2014/main" id="{25254EA9-5C46-D129-6D0C-441BA819A42C}"/>
+              </a:ext>
+              <a:ext uri="{C183D7F6-B498-43B3-948B-1728B52AA6E4}">
+                <adec:decorative xmlns:adec="http://schemas.microsoft.com/office/drawing/2017/decorative" val="1"/>
+              </a:ext>
+            </a:extLst>
+          </p:cNvPr>
+          <p:cNvSpPr>
+            <a:spLocks noGrp="1" noRot="1" noChangeAspect="1" noMove="1" noResize="1" noEditPoints="1" noAdjustHandles="1" noChangeArrowheads="1" noChangeShapeType="1" noTextEdit="1"/>
+          </p:cNvSpPr>
+          <p:nvPr>
+            <p:extLst>
+              <p:ext uri="{386F3935-93C4-4BCD-93E2-E3B085C9AB24}">
+                <p16:designElem xmlns:p16="http://schemas.microsoft.com/office/powerpoint/2015/main" val="1"/>
+              </p:ext>
+            </p:extLst>
+          </p:nvPr>
+        </p:nvSpPr>
+        <p:spPr>
+          <a:xfrm>
+            <a:off x="8042147" y="453643"/>
+            <a:ext cx="3703320" cy="98554"/>
+          </a:xfrm>
+          <a:prstGeom prst="rect">
+            <a:avLst/>
+          </a:prstGeom>
+          <a:solidFill>
+            <a:srgbClr val="969FA7"/>
+          </a:solidFill>
+          <a:ln>
+            <a:noFill/>
+          </a:ln>
+          <a:effectLst/>
+        </p:spPr>
+        <p:style>
+          <a:lnRef idx="1">
+            <a:schemeClr val="accent1"/>
+          </a:lnRef>
+          <a:fillRef idx="3">
+            <a:schemeClr val="accent1"/>
+          </a:fillRef>
+          <a:effectRef idx="2">
+            <a:schemeClr val="accent1"/>
+          </a:effectRef>
+          <a:fontRef idx="minor">
+            <a:schemeClr val="lt1"/>
+          </a:fontRef>
+        </p:style>
+        <p:txBody>
+          <a:bodyPr/>
+          <a:lstStyle/>
+          <a:p>
+            <a:endParaRPr lang="en-GB"/>
+          </a:p>
+        </p:txBody>
+      </p:sp>
+      <p:sp>
+        <p:nvSpPr>
+          <p:cNvPr id="12" name="Rectangle 11">
+            <a:extLst>
+              <a:ext uri="{FF2B5EF4-FFF2-40B4-BE49-F238E27FC236}">
+                <a16:creationId xmlns:a16="http://schemas.microsoft.com/office/drawing/2014/main" id="{EDDDE7C7-7505-D6EB-98D4-53F0E512B9D5}"/>
+              </a:ext>
+              <a:ext uri="{C183D7F6-B498-43B3-948B-1728B52AA6E4}">
+                <adec:decorative xmlns:adec="http://schemas.microsoft.com/office/drawing/2017/decorative" val="1"/>
+              </a:ext>
+            </a:extLst>
+          </p:cNvPr>
+          <p:cNvSpPr>
+            <a:spLocks noGrp="1" noRot="1" noChangeAspect="1" noMove="1" noResize="1" noEditPoints="1" noAdjustHandles="1" noChangeArrowheads="1" noChangeShapeType="1" noTextEdit="1"/>
+          </p:cNvSpPr>
+          <p:nvPr>
+            <p:extLst>
+              <p:ext uri="{386F3935-93C4-4BCD-93E2-E3B085C9AB24}">
+                <p16:designElem xmlns:p16="http://schemas.microsoft.com/office/powerpoint/2015/main" val="1"/>
+              </p:ext>
+            </p:extLst>
+          </p:nvPr>
+        </p:nvSpPr>
+        <p:spPr>
+          <a:xfrm>
+            <a:off x="4241830" y="457200"/>
+            <a:ext cx="3703320" cy="91440"/>
+          </a:xfrm>
+          <a:prstGeom prst="rect">
+            <a:avLst/>
+          </a:prstGeom>
+          <a:solidFill>
+            <a:schemeClr val="accent1"/>
+          </a:solidFill>
+          <a:ln>
+            <a:noFill/>
+          </a:ln>
+          <a:effectLst/>
+        </p:spPr>
+        <p:style>
+          <a:lnRef idx="1">
+            <a:schemeClr val="accent1"/>
+          </a:lnRef>
+          <a:fillRef idx="3">
+            <a:schemeClr val="accent1"/>
+          </a:fillRef>
+          <a:effectRef idx="2">
+            <a:schemeClr val="accent1"/>
+          </a:effectRef>
+          <a:fontRef idx="minor">
+            <a:schemeClr val="lt1"/>
+          </a:fontRef>
+        </p:style>
+        <p:txBody>
+          <a:bodyPr/>
+          <a:lstStyle/>
+          <a:p>
+            <a:endParaRPr lang="en-GB"/>
+          </a:p>
+        </p:txBody>
+      </p:sp>
+      <p:sp>
+        <p:nvSpPr>
+          <p:cNvPr id="14" name="Rectangle 13">
+            <a:extLst>
+              <a:ext uri="{FF2B5EF4-FFF2-40B4-BE49-F238E27FC236}">
+                <a16:creationId xmlns:a16="http://schemas.microsoft.com/office/drawing/2014/main" id="{7AF437A3-AD05-DEB4-5D56-50143CEB6D75}"/>
+              </a:ext>
+              <a:ext uri="{C183D7F6-B498-43B3-948B-1728B52AA6E4}">
+                <adec:decorative xmlns:adec="http://schemas.microsoft.com/office/drawing/2017/decorative" val="1"/>
+              </a:ext>
+            </a:extLst>
+          </p:cNvPr>
+          <p:cNvSpPr>
+            <a:spLocks noGrp="1" noRot="1" noChangeAspect="1" noMove="1" noResize="1" noEditPoints="1" noAdjustHandles="1" noChangeArrowheads="1" noChangeShapeType="1" noTextEdit="1"/>
+          </p:cNvSpPr>
+          <p:nvPr>
+            <p:extLst>
+              <p:ext uri="{386F3935-93C4-4BCD-93E2-E3B085C9AB24}">
+                <p16:designElem xmlns:p16="http://schemas.microsoft.com/office/powerpoint/2015/main" val="1"/>
+              </p:ext>
+            </p:extLst>
+          </p:nvPr>
+        </p:nvSpPr>
+        <p:spPr>
+          <a:xfrm>
+            <a:off x="446534" y="3085764"/>
+            <a:ext cx="11298932" cy="3338149"/>
+          </a:xfrm>
+          <a:prstGeom prst="rect">
+            <a:avLst/>
+          </a:prstGeom>
+          <a:solidFill>
+            <a:srgbClr val="465359"/>
+          </a:solidFill>
+          <a:ln>
+            <a:noFill/>
+          </a:ln>
+          <a:effectLst/>
+        </p:spPr>
+        <p:style>
+          <a:lnRef idx="1">
+            <a:schemeClr val="accent1"/>
+          </a:lnRef>
+          <a:fillRef idx="3">
+            <a:schemeClr val="accent1"/>
+          </a:fillRef>
+          <a:effectRef idx="2">
+            <a:schemeClr val="accent1"/>
+          </a:effectRef>
+          <a:fontRef idx="minor">
+            <a:schemeClr val="lt1"/>
+          </a:fontRef>
+        </p:style>
+        <p:txBody>
+          <a:bodyPr/>
+          <a:lstStyle/>
+          <a:p>
+            <a:endParaRPr lang="en-GB"/>
+          </a:p>
+        </p:txBody>
+      </p:sp>
+      <p:sp>
+        <p:nvSpPr>
+          <p:cNvPr id="16" name="Rectangle 15">
+            <a:extLst>
+              <a:ext uri="{FF2B5EF4-FFF2-40B4-BE49-F238E27FC236}">
+                <a16:creationId xmlns:a16="http://schemas.microsoft.com/office/drawing/2014/main" id="{5AE804DC-D74E-2941-EBE6-4D93A6E228DA}"/>
+              </a:ext>
+              <a:ext uri="{C183D7F6-B498-43B3-948B-1728B52AA6E4}">
+                <adec:decorative xmlns:adec="http://schemas.microsoft.com/office/drawing/2017/decorative" val="1"/>
+              </a:ext>
+            </a:extLst>
+          </p:cNvPr>
+          <p:cNvSpPr>
+            <a:spLocks noGrp="1" noRot="1" noChangeAspect="1" noMove="1" noResize="1" noEditPoints="1" noAdjustHandles="1" noChangeArrowheads="1" noChangeShapeType="1" noTextEdit="1"/>
+          </p:cNvSpPr>
+          <p:nvPr>
+            <p:extLst>
+              <p:ext uri="{386F3935-93C4-4BCD-93E2-E3B085C9AB24}">
+                <p16:designElem xmlns:p16="http://schemas.microsoft.com/office/powerpoint/2015/main" val="1"/>
+              </p:ext>
+            </p:extLst>
+          </p:nvPr>
+        </p:nvSpPr>
+        <p:spPr>
+          <a:xfrm>
+            <a:off x="0" y="0"/>
+            <a:ext cx="12192000" cy="6858000"/>
+          </a:xfrm>
+          <a:prstGeom prst="rect">
+            <a:avLst/>
+          </a:prstGeom>
+          <a:solidFill>
+            <a:srgbClr val="3C474C"/>
+          </a:solidFill>
+          <a:ln>
+            <a:noFill/>
+          </a:ln>
+        </p:spPr>
+        <p:style>
+          <a:lnRef idx="2">
+            <a:schemeClr val="accent1">
+              <a:shade val="50000"/>
+            </a:schemeClr>
+          </a:lnRef>
+          <a:fillRef idx="1">
+            <a:schemeClr val="accent1"/>
+          </a:fillRef>
+          <a:effectRef idx="0">
+            <a:schemeClr val="accent1"/>
+          </a:effectRef>
+          <a:fontRef idx="minor">
+            <a:schemeClr val="lt1"/>
+          </a:fontRef>
+        </p:style>
+        <p:txBody>
+          <a:bodyPr rtlCol="0" anchor="ctr"/>
+          <a:lstStyle/>
+          <a:p>
+            <a:pPr algn="ctr"/>
+            <a:endParaRPr lang="en-US"/>
+          </a:p>
+        </p:txBody>
+      </p:sp>
+      <p:sp>
+        <p:nvSpPr>
+          <p:cNvPr id="2" name="Title 1">
+            <a:extLst>
+              <a:ext uri="{FF2B5EF4-FFF2-40B4-BE49-F238E27FC236}">
+                <a16:creationId xmlns:a16="http://schemas.microsoft.com/office/drawing/2014/main" id="{E12614BC-CB1C-F0C9-E92C-2A9CA0A5E4EB}"/>
+              </a:ext>
+            </a:extLst>
+          </p:cNvPr>
+          <p:cNvSpPr>
+            <a:spLocks noGrp="1"/>
+          </p:cNvSpPr>
+          <p:nvPr>
+            <p:ph type="title"/>
+          </p:nvPr>
+        </p:nvSpPr>
+        <p:spPr>
+          <a:xfrm>
+            <a:off x="783771" y="1066800"/>
+            <a:ext cx="5727760" cy="4724400"/>
+          </a:xfrm>
+        </p:spPr>
+        <p:txBody>
+          <a:bodyPr vert="horz" lIns="91440" tIns="45720" rIns="91440" bIns="45720" rtlCol="0" anchor="ctr">
+            <a:normAutofit/>
+          </a:bodyPr>
+          <a:lstStyle/>
+          <a:p>
+            <a:pPr algn="r"/>
+            <a:r>
+              <a:rPr lang="en-US" sz="6600" b="0" kern="1200" cap="all" dirty="0">
+                <a:solidFill>
+                  <a:srgbClr val="FFFFFF">
+                    <a:alpha val="90000"/>
+                  </a:srgbClr>
+                </a:solidFill>
+                <a:latin typeface="+mj-lt"/>
+                <a:ea typeface="+mj-ea"/>
+                <a:cs typeface="+mj-cs"/>
+              </a:rPr>
+              <a:t>results</a:t>
+            </a:r>
+          </a:p>
+        </p:txBody>
+      </p:sp>
+      <p:sp>
+        <p:nvSpPr>
+          <p:cNvPr id="3" name="Text Placeholder 2">
+            <a:extLst>
+              <a:ext uri="{FF2B5EF4-FFF2-40B4-BE49-F238E27FC236}">
+                <a16:creationId xmlns:a16="http://schemas.microsoft.com/office/drawing/2014/main" id="{9E603ABF-7CAB-C227-0426-B76B895213BF}"/>
+              </a:ext>
+            </a:extLst>
+          </p:cNvPr>
+          <p:cNvSpPr>
+            <a:spLocks noGrp="1"/>
+          </p:cNvSpPr>
+          <p:nvPr>
+            <p:ph type="body" idx="1"/>
+          </p:nvPr>
+        </p:nvSpPr>
+        <p:spPr>
+          <a:xfrm>
+            <a:off x="7534655" y="1066800"/>
+            <a:ext cx="3405015" cy="4724400"/>
+          </a:xfrm>
+          <a:ln w="57150">
+            <a:noFill/>
+          </a:ln>
+        </p:spPr>
+        <p:txBody>
+          <a:bodyPr vert="horz" lIns="91440" tIns="45720" rIns="91440" bIns="45720" rtlCol="0" anchor="ctr">
+            <a:normAutofit/>
+          </a:bodyPr>
+          <a:lstStyle/>
+          <a:p>
+            <a:endParaRPr lang="en-US" sz="2800">
+              <a:solidFill>
+                <a:srgbClr val="FFFFFF"/>
+              </a:solidFill>
+            </a:endParaRPr>
+          </a:p>
+        </p:txBody>
+      </p:sp>
+      <p:sp>
+        <p:nvSpPr>
+          <p:cNvPr id="18" name="Rectangle 17">
+            <a:extLst>
+              <a:ext uri="{FF2B5EF4-FFF2-40B4-BE49-F238E27FC236}">
+                <a16:creationId xmlns:a16="http://schemas.microsoft.com/office/drawing/2014/main" id="{32D50C66-874F-DAE9-8BBE-5C1AAAB5315E}"/>
+              </a:ext>
+              <a:ext uri="{C183D7F6-B498-43B3-948B-1728B52AA6E4}">
+                <adec:decorative xmlns:adec="http://schemas.microsoft.com/office/drawing/2017/decorative" val="1"/>
+              </a:ext>
+            </a:extLst>
+          </p:cNvPr>
+          <p:cNvSpPr>
+            <a:spLocks noGrp="1" noRot="1" noChangeAspect="1" noMove="1" noResize="1" noEditPoints="1" noAdjustHandles="1" noChangeArrowheads="1" noChangeShapeType="1" noTextEdit="1"/>
+          </p:cNvSpPr>
+          <p:nvPr>
+            <p:extLst>
+              <p:ext uri="{386F3935-93C4-4BCD-93E2-E3B085C9AB24}">
+                <p16:designElem xmlns:p16="http://schemas.microsoft.com/office/powerpoint/2015/main" val="1"/>
+              </p:ext>
+            </p:extLst>
+          </p:nvPr>
+        </p:nvSpPr>
+        <p:spPr>
+          <a:xfrm rot="16200000">
+            <a:off x="5171433" y="3396996"/>
+            <a:ext cx="3703320" cy="64008"/>
+          </a:xfrm>
+          <a:prstGeom prst="rect">
+            <a:avLst/>
+          </a:prstGeom>
+          <a:solidFill>
+            <a:schemeClr val="accent1"/>
+          </a:solidFill>
+          <a:ln>
+            <a:noFill/>
+          </a:ln>
+          <a:effectLst/>
+        </p:spPr>
+        <p:style>
+          <a:lnRef idx="1">
+            <a:schemeClr val="accent1"/>
+          </a:lnRef>
+          <a:fillRef idx="3">
+            <a:schemeClr val="accent1"/>
+          </a:fillRef>
+          <a:effectRef idx="2">
+            <a:schemeClr val="accent1"/>
+          </a:effectRef>
+          <a:fontRef idx="minor">
+            <a:schemeClr val="lt1"/>
+          </a:fontRef>
+        </p:style>
+        <p:txBody>
+          <a:bodyPr/>
+          <a:lstStyle/>
+          <a:p>
+            <a:endParaRPr lang="en-GB"/>
+          </a:p>
+        </p:txBody>
+      </p:sp>
+    </p:spTree>
+    <p:extLst>
+      <p:ext uri="{BB962C8B-B14F-4D97-AF65-F5344CB8AC3E}">
+        <p14:creationId xmlns:p14="http://schemas.microsoft.com/office/powerpoint/2010/main" val="324618419"/>
+      </p:ext>
+    </p:extLst>
+  </p:cSld>
+  <p:clrMapOvr>
+    <a:overrideClrMapping bg1="dk1" tx1="lt1" bg2="dk2" tx2="lt2" accent1="accent1" accent2="accent2" accent3="accent3" accent4="accent4" accent5="accent5" accent6="accent6" hlink="hlink" folHlink="folHlink"/>
+  </p:clrMapOvr>
+</p:sld>
+</file>
+
+<file path=ppt/slides/slide15.xml><?xml version="1.0" encoding="utf-8"?>
+<p:sld xmlns:a="http://schemas.openxmlformats.org/drawingml/2006/main" xmlns:r="http://schemas.openxmlformats.org/officeDocument/2006/relationships" xmlns:p="http://schemas.openxmlformats.org/presentationml/2006/main">
+  <p:cSld>
+    <p:spTree>
+      <p:nvGrpSpPr>
+        <p:cNvPr id="1" name=""/>
+        <p:cNvGrpSpPr/>
+        <p:nvPr/>
+      </p:nvGrpSpPr>
+      <p:grpSpPr>
+        <a:xfrm>
+          <a:off x="0" y="0"/>
+          <a:ext cx="0" cy="0"/>
+          <a:chOff x="0" y="0"/>
+          <a:chExt cx="0" cy="0"/>
+        </a:xfrm>
+      </p:grpSpPr>
+      <p:sp>
+        <p:nvSpPr>
+          <p:cNvPr id="2" name="Title 1">
+            <a:extLst>
+              <a:ext uri="{FF2B5EF4-FFF2-40B4-BE49-F238E27FC236}">
+                <a16:creationId xmlns:a16="http://schemas.microsoft.com/office/drawing/2014/main" id="{691F774E-1CEA-2EE4-2681-520A8826D91E}"/>
+              </a:ext>
+            </a:extLst>
+          </p:cNvPr>
+          <p:cNvSpPr>
+            <a:spLocks noGrp="1"/>
+          </p:cNvSpPr>
+          <p:nvPr>
+            <p:ph type="title"/>
+          </p:nvPr>
+        </p:nvSpPr>
+        <p:spPr/>
+        <p:txBody>
+          <a:bodyPr/>
+          <a:lstStyle/>
+          <a:p>
+            <a:r>
+              <a:rPr lang="en-GB" dirty="0"/>
+              <a:t>Results</a:t>
+            </a:r>
+            <a:br>
+              <a:rPr lang="en-GB" dirty="0"/>
+            </a:br>
+            <a:r>
+              <a:rPr lang="en-GB" sz="2800" b="1" dirty="0"/>
+              <a:t>CIFAKE</a:t>
+            </a:r>
+            <a:endParaRPr lang="en-GB" b="1" dirty="0"/>
+          </a:p>
+        </p:txBody>
+      </p:sp>
+      <p:sp>
+        <p:nvSpPr>
+          <p:cNvPr id="3" name="Content Placeholder 2">
+            <a:extLst>
+              <a:ext uri="{FF2B5EF4-FFF2-40B4-BE49-F238E27FC236}">
+                <a16:creationId xmlns:a16="http://schemas.microsoft.com/office/drawing/2014/main" id="{10D65002-494C-6EF3-B683-52C41F95C9FE}"/>
+              </a:ext>
+            </a:extLst>
+          </p:cNvPr>
+          <p:cNvSpPr>
+            <a:spLocks noGrp="1"/>
+          </p:cNvSpPr>
+          <p:nvPr>
+            <p:ph idx="1"/>
+          </p:nvPr>
+        </p:nvSpPr>
+        <p:spPr/>
+        <p:txBody>
+          <a:bodyPr/>
+          <a:lstStyle/>
+          <a:p>
+            <a:r>
+              <a:rPr lang="en-GB" dirty="0"/>
+              <a:t>Base model performance</a:t>
+            </a:r>
+          </a:p>
+          <a:p>
+            <a:r>
+              <a:rPr lang="en-GB" dirty="0"/>
+              <a:t>one thresh effect plot</a:t>
+            </a:r>
+          </a:p>
+          <a:p>
+            <a:r>
+              <a:rPr lang="en-GB" dirty="0"/>
+              <a:t>Then: tiny &amp; mini models (train/</a:t>
+            </a:r>
+            <a:r>
+              <a:rPr lang="en-GB" dirty="0" err="1"/>
+              <a:t>val</a:t>
+            </a:r>
+            <a:r>
+              <a:rPr lang="en-GB" dirty="0"/>
+              <a:t> loss , </a:t>
+            </a:r>
+            <a:r>
+              <a:rPr lang="en-GB" dirty="0" err="1"/>
+              <a:t>acc</a:t>
+            </a:r>
+            <a:r>
+              <a:rPr lang="en-GB"/>
+              <a:t> plot(s))</a:t>
+            </a:r>
+            <a:endParaRPr lang="en-GB" dirty="0"/>
+          </a:p>
+          <a:p>
+            <a:r>
+              <a:rPr lang="en-GB" dirty="0"/>
+              <a:t>Then: attention modification</a:t>
+            </a:r>
+          </a:p>
+        </p:txBody>
+      </p:sp>
+    </p:spTree>
+    <p:extLst>
+      <p:ext uri="{BB962C8B-B14F-4D97-AF65-F5344CB8AC3E}">
+        <p14:creationId xmlns:p14="http://schemas.microsoft.com/office/powerpoint/2010/main" val="3826932345"/>
+      </p:ext>
+    </p:extLst>
+  </p:cSld>
+  <p:clrMapOvr>
+    <a:masterClrMapping/>
+  </p:clrMapOvr>
+</p:sld>
+</file>
+
+<file path=ppt/slides/slide16.xml><?xml version="1.0" encoding="utf-8"?>
+<p:sld xmlns:a="http://schemas.openxmlformats.org/drawingml/2006/main" xmlns:r="http://schemas.openxmlformats.org/officeDocument/2006/relationships" xmlns:p="http://schemas.openxmlformats.org/presentationml/2006/main">
+  <p:cSld>
+    <p:spTree>
+      <p:nvGrpSpPr>
+        <p:cNvPr id="1" name="">
+          <a:extLst>
+            <a:ext uri="{FF2B5EF4-FFF2-40B4-BE49-F238E27FC236}">
+              <a16:creationId xmlns:a16="http://schemas.microsoft.com/office/drawing/2014/main" id="{8D4BA392-4E7D-40EE-5DE1-04C35E3F3D65}"/>
+            </a:ext>
+          </a:extLst>
+        </p:cNvPr>
+        <p:cNvGrpSpPr/>
+        <p:nvPr/>
+      </p:nvGrpSpPr>
+      <p:grpSpPr>
+        <a:xfrm>
+          <a:off x="0" y="0"/>
+          <a:ext cx="0" cy="0"/>
+          <a:chOff x="0" y="0"/>
+          <a:chExt cx="0" cy="0"/>
+        </a:xfrm>
+      </p:grpSpPr>
+      <p:sp>
+        <p:nvSpPr>
+          <p:cNvPr id="2" name="Title 1">
+            <a:extLst>
+              <a:ext uri="{FF2B5EF4-FFF2-40B4-BE49-F238E27FC236}">
+                <a16:creationId xmlns:a16="http://schemas.microsoft.com/office/drawing/2014/main" id="{3BE8C38C-D53C-1709-E580-83BD5E69A522}"/>
+              </a:ext>
+            </a:extLst>
+          </p:cNvPr>
+          <p:cNvSpPr>
+            <a:spLocks noGrp="1"/>
+          </p:cNvSpPr>
+          <p:nvPr>
+            <p:ph type="title"/>
+          </p:nvPr>
+        </p:nvSpPr>
+        <p:spPr/>
+        <p:txBody>
+          <a:bodyPr/>
+          <a:lstStyle/>
+          <a:p>
+            <a:r>
+              <a:rPr lang="en-GB" dirty="0"/>
+              <a:t>Results</a:t>
+            </a:r>
+            <a:br>
+              <a:rPr lang="en-GB" dirty="0"/>
+            </a:br>
+            <a:r>
+              <a:rPr lang="en-GB" sz="2800" b="1" dirty="0" err="1"/>
+              <a:t>TRansfer</a:t>
+            </a:r>
+            <a:endParaRPr lang="en-GB" b="1" dirty="0"/>
+          </a:p>
+        </p:txBody>
+      </p:sp>
+      <p:sp>
+        <p:nvSpPr>
+          <p:cNvPr id="3" name="Content Placeholder 2">
+            <a:extLst>
+              <a:ext uri="{FF2B5EF4-FFF2-40B4-BE49-F238E27FC236}">
+                <a16:creationId xmlns:a16="http://schemas.microsoft.com/office/drawing/2014/main" id="{31A86244-D3A1-8ADC-CE70-215E84DB7C25}"/>
+              </a:ext>
+            </a:extLst>
+          </p:cNvPr>
+          <p:cNvSpPr>
+            <a:spLocks noGrp="1"/>
+          </p:cNvSpPr>
+          <p:nvPr>
+            <p:ph idx="1"/>
+          </p:nvPr>
+        </p:nvSpPr>
+        <p:spPr/>
+        <p:txBody>
+          <a:bodyPr/>
+          <a:lstStyle/>
+          <a:p>
+            <a:r>
+              <a:rPr lang="en-GB" dirty="0"/>
+              <a:t>On cifar100: base, mini, attn on coarse vs fine</a:t>
+            </a:r>
+          </a:p>
+        </p:txBody>
+      </p:sp>
+    </p:spTree>
+    <p:extLst>
+      <p:ext uri="{BB962C8B-B14F-4D97-AF65-F5344CB8AC3E}">
+        <p14:creationId xmlns:p14="http://schemas.microsoft.com/office/powerpoint/2010/main" val="2301266789"/>
+      </p:ext>
+    </p:extLst>
+  </p:cSld>
+  <p:clrMapOvr>
+    <a:masterClrMapping/>
+  </p:clrMapOvr>
+</p:sld>
+</file>
+
+<file path=ppt/slides/slide17.xml><?xml version="1.0" encoding="utf-8"?>
+<p:sld xmlns:a="http://schemas.openxmlformats.org/drawingml/2006/main" xmlns:r="http://schemas.openxmlformats.org/officeDocument/2006/relationships" xmlns:p="http://schemas.openxmlformats.org/presentationml/2006/main">
+  <p:cSld>
+    <p:bg>
+      <p:bgPr>
+        <a:solidFill>
+          <a:schemeClr val="bg2"/>
+        </a:solidFill>
+        <a:effectLst/>
+      </p:bgPr>
+    </p:bg>
+    <p:spTree>
+      <p:nvGrpSpPr>
+        <p:cNvPr id="1" name="">
+          <a:extLst>
+            <a:ext uri="{FF2B5EF4-FFF2-40B4-BE49-F238E27FC236}">
+              <a16:creationId xmlns:a16="http://schemas.microsoft.com/office/drawing/2014/main" id="{32BE0396-AA82-70B5-8196-B40D21EC8137}"/>
+            </a:ext>
+          </a:extLst>
+        </p:cNvPr>
+        <p:cNvGrpSpPr/>
+        <p:nvPr/>
+      </p:nvGrpSpPr>
+      <p:grpSpPr>
+        <a:xfrm>
+          <a:off x="0" y="0"/>
+          <a:ext cx="0" cy="0"/>
+          <a:chOff x="0" y="0"/>
+          <a:chExt cx="0" cy="0"/>
+        </a:xfrm>
+      </p:grpSpPr>
+      <p:sp>
+        <p:nvSpPr>
+          <p:cNvPr id="8" name="Rectangle 7">
+            <a:extLst>
+              <a:ext uri="{FF2B5EF4-FFF2-40B4-BE49-F238E27FC236}">
+                <a16:creationId xmlns:a16="http://schemas.microsoft.com/office/drawing/2014/main" id="{0DBEAF4F-F029-D89C-01F5-620A2A1A5726}"/>
+              </a:ext>
+              <a:ext uri="{C183D7F6-B498-43B3-948B-1728B52AA6E4}">
+                <adec:decorative xmlns:adec="http://schemas.microsoft.com/office/drawing/2017/decorative" val="1"/>
+              </a:ext>
+            </a:extLst>
+          </p:cNvPr>
+          <p:cNvSpPr>
+            <a:spLocks noGrp="1" noRot="1" noChangeAspect="1" noMove="1" noResize="1" noEditPoints="1" noAdjustHandles="1" noChangeArrowheads="1" noChangeShapeType="1" noTextEdit="1"/>
+          </p:cNvSpPr>
+          <p:nvPr>
+            <p:extLst>
+              <p:ext uri="{386F3935-93C4-4BCD-93E2-E3B085C9AB24}">
+                <p16:designElem xmlns:p16="http://schemas.microsoft.com/office/powerpoint/2015/main" val="1"/>
+              </p:ext>
+            </p:extLst>
+          </p:nvPr>
+        </p:nvSpPr>
+        <p:spPr>
+          <a:xfrm>
+            <a:off x="446534" y="457200"/>
+            <a:ext cx="3703320" cy="94997"/>
+          </a:xfrm>
+          <a:prstGeom prst="rect">
+            <a:avLst/>
+          </a:prstGeom>
+          <a:solidFill>
+            <a:srgbClr val="465359"/>
+          </a:solidFill>
+          <a:ln>
+            <a:noFill/>
+          </a:ln>
+          <a:effectLst/>
+        </p:spPr>
+        <p:style>
+          <a:lnRef idx="1">
+            <a:schemeClr val="accent1"/>
+          </a:lnRef>
+          <a:fillRef idx="3">
+            <a:schemeClr val="accent1"/>
+          </a:fillRef>
+          <a:effectRef idx="2">
+            <a:schemeClr val="accent1"/>
+          </a:effectRef>
+          <a:fontRef idx="minor">
+            <a:schemeClr val="lt1"/>
+          </a:fontRef>
+        </p:style>
+        <p:txBody>
+          <a:bodyPr/>
+          <a:lstStyle/>
+          <a:p>
+            <a:endParaRPr lang="en-GB"/>
+          </a:p>
+        </p:txBody>
+      </p:sp>
+      <p:sp>
+        <p:nvSpPr>
+          <p:cNvPr id="10" name="Rectangle 9">
+            <a:extLst>
+              <a:ext uri="{FF2B5EF4-FFF2-40B4-BE49-F238E27FC236}">
+                <a16:creationId xmlns:a16="http://schemas.microsoft.com/office/drawing/2014/main" id="{B32D3A1E-7E41-AFEE-1069-4A43799DFCEA}"/>
+              </a:ext>
+              <a:ext uri="{C183D7F6-B498-43B3-948B-1728B52AA6E4}">
+                <adec:decorative xmlns:adec="http://schemas.microsoft.com/office/drawing/2017/decorative" val="1"/>
+              </a:ext>
+            </a:extLst>
+          </p:cNvPr>
+          <p:cNvSpPr>
+            <a:spLocks noGrp="1" noRot="1" noChangeAspect="1" noMove="1" noResize="1" noEditPoints="1" noAdjustHandles="1" noChangeArrowheads="1" noChangeShapeType="1" noTextEdit="1"/>
+          </p:cNvSpPr>
+          <p:nvPr>
+            <p:extLst>
+              <p:ext uri="{386F3935-93C4-4BCD-93E2-E3B085C9AB24}">
+                <p16:designElem xmlns:p16="http://schemas.microsoft.com/office/powerpoint/2015/main" val="1"/>
+              </p:ext>
+            </p:extLst>
+          </p:nvPr>
+        </p:nvSpPr>
+        <p:spPr>
+          <a:xfrm>
+            <a:off x="8042147" y="453643"/>
+            <a:ext cx="3703320" cy="98554"/>
+          </a:xfrm>
+          <a:prstGeom prst="rect">
+            <a:avLst/>
+          </a:prstGeom>
+          <a:solidFill>
+            <a:srgbClr val="969FA7"/>
+          </a:solidFill>
+          <a:ln>
+            <a:noFill/>
+          </a:ln>
+          <a:effectLst/>
+        </p:spPr>
+        <p:style>
+          <a:lnRef idx="1">
+            <a:schemeClr val="accent1"/>
+          </a:lnRef>
+          <a:fillRef idx="3">
+            <a:schemeClr val="accent1"/>
+          </a:fillRef>
+          <a:effectRef idx="2">
+            <a:schemeClr val="accent1"/>
+          </a:effectRef>
+          <a:fontRef idx="minor">
+            <a:schemeClr val="lt1"/>
+          </a:fontRef>
+        </p:style>
+        <p:txBody>
+          <a:bodyPr/>
+          <a:lstStyle/>
+          <a:p>
+            <a:endParaRPr lang="en-GB"/>
+          </a:p>
+        </p:txBody>
+      </p:sp>
+      <p:sp>
+        <p:nvSpPr>
+          <p:cNvPr id="12" name="Rectangle 11">
+            <a:extLst>
+              <a:ext uri="{FF2B5EF4-FFF2-40B4-BE49-F238E27FC236}">
+                <a16:creationId xmlns:a16="http://schemas.microsoft.com/office/drawing/2014/main" id="{F8CF839C-41EC-DCCA-1BBA-8ABABA34EB2D}"/>
+              </a:ext>
+              <a:ext uri="{C183D7F6-B498-43B3-948B-1728B52AA6E4}">
+                <adec:decorative xmlns:adec="http://schemas.microsoft.com/office/drawing/2017/decorative" val="1"/>
+              </a:ext>
+            </a:extLst>
+          </p:cNvPr>
+          <p:cNvSpPr>
+            <a:spLocks noGrp="1" noRot="1" noChangeAspect="1" noMove="1" noResize="1" noEditPoints="1" noAdjustHandles="1" noChangeArrowheads="1" noChangeShapeType="1" noTextEdit="1"/>
+          </p:cNvSpPr>
+          <p:nvPr>
+            <p:extLst>
+              <p:ext uri="{386F3935-93C4-4BCD-93E2-E3B085C9AB24}">
+                <p16:designElem xmlns:p16="http://schemas.microsoft.com/office/powerpoint/2015/main" val="1"/>
+              </p:ext>
+            </p:extLst>
+          </p:nvPr>
+        </p:nvSpPr>
+        <p:spPr>
+          <a:xfrm>
+            <a:off x="4241830" y="457200"/>
+            <a:ext cx="3703320" cy="91440"/>
+          </a:xfrm>
+          <a:prstGeom prst="rect">
+            <a:avLst/>
+          </a:prstGeom>
+          <a:solidFill>
+            <a:schemeClr val="accent1"/>
+          </a:solidFill>
+          <a:ln>
+            <a:noFill/>
+          </a:ln>
+          <a:effectLst/>
+        </p:spPr>
+        <p:style>
+          <a:lnRef idx="1">
+            <a:schemeClr val="accent1"/>
+          </a:lnRef>
+          <a:fillRef idx="3">
+            <a:schemeClr val="accent1"/>
+          </a:fillRef>
+          <a:effectRef idx="2">
+            <a:schemeClr val="accent1"/>
+          </a:effectRef>
+          <a:fontRef idx="minor">
+            <a:schemeClr val="lt1"/>
+          </a:fontRef>
+        </p:style>
+        <p:txBody>
+          <a:bodyPr/>
+          <a:lstStyle/>
+          <a:p>
+            <a:endParaRPr lang="en-GB"/>
+          </a:p>
+        </p:txBody>
+      </p:sp>
+      <p:sp>
+        <p:nvSpPr>
+          <p:cNvPr id="14" name="Rectangle 13">
+            <a:extLst>
+              <a:ext uri="{FF2B5EF4-FFF2-40B4-BE49-F238E27FC236}">
+                <a16:creationId xmlns:a16="http://schemas.microsoft.com/office/drawing/2014/main" id="{E55A6354-27B9-4AFF-3A8D-55DE061008DE}"/>
+              </a:ext>
+              <a:ext uri="{C183D7F6-B498-43B3-948B-1728B52AA6E4}">
+                <adec:decorative xmlns:adec="http://schemas.microsoft.com/office/drawing/2017/decorative" val="1"/>
+              </a:ext>
+            </a:extLst>
+          </p:cNvPr>
+          <p:cNvSpPr>
+            <a:spLocks noGrp="1" noRot="1" noChangeAspect="1" noMove="1" noResize="1" noEditPoints="1" noAdjustHandles="1" noChangeArrowheads="1" noChangeShapeType="1" noTextEdit="1"/>
+          </p:cNvSpPr>
+          <p:nvPr>
+            <p:extLst>
+              <p:ext uri="{386F3935-93C4-4BCD-93E2-E3B085C9AB24}">
+                <p16:designElem xmlns:p16="http://schemas.microsoft.com/office/powerpoint/2015/main" val="1"/>
+              </p:ext>
+            </p:extLst>
+          </p:nvPr>
+        </p:nvSpPr>
+        <p:spPr>
+          <a:xfrm>
+            <a:off x="446534" y="3085764"/>
+            <a:ext cx="11298932" cy="3338149"/>
+          </a:xfrm>
+          <a:prstGeom prst="rect">
+            <a:avLst/>
+          </a:prstGeom>
+          <a:solidFill>
+            <a:srgbClr val="465359"/>
+          </a:solidFill>
+          <a:ln>
+            <a:noFill/>
+          </a:ln>
+          <a:effectLst/>
+        </p:spPr>
+        <p:style>
+          <a:lnRef idx="1">
+            <a:schemeClr val="accent1"/>
+          </a:lnRef>
+          <a:fillRef idx="3">
+            <a:schemeClr val="accent1"/>
+          </a:fillRef>
+          <a:effectRef idx="2">
+            <a:schemeClr val="accent1"/>
+          </a:effectRef>
+          <a:fontRef idx="minor">
+            <a:schemeClr val="lt1"/>
+          </a:fontRef>
+        </p:style>
+        <p:txBody>
+          <a:bodyPr/>
+          <a:lstStyle/>
+          <a:p>
+            <a:endParaRPr lang="en-GB"/>
+          </a:p>
+        </p:txBody>
+      </p:sp>
+      <p:sp>
+        <p:nvSpPr>
+          <p:cNvPr id="16" name="Rectangle 15">
+            <a:extLst>
+              <a:ext uri="{FF2B5EF4-FFF2-40B4-BE49-F238E27FC236}">
+                <a16:creationId xmlns:a16="http://schemas.microsoft.com/office/drawing/2014/main" id="{9C0BEE83-8427-FA3E-CF8D-998D14895E5F}"/>
+              </a:ext>
+              <a:ext uri="{C183D7F6-B498-43B3-948B-1728B52AA6E4}">
+                <adec:decorative xmlns:adec="http://schemas.microsoft.com/office/drawing/2017/decorative" val="1"/>
+              </a:ext>
+            </a:extLst>
+          </p:cNvPr>
+          <p:cNvSpPr>
+            <a:spLocks noGrp="1" noRot="1" noChangeAspect="1" noMove="1" noResize="1" noEditPoints="1" noAdjustHandles="1" noChangeArrowheads="1" noChangeShapeType="1" noTextEdit="1"/>
+          </p:cNvSpPr>
+          <p:nvPr>
+            <p:extLst>
+              <p:ext uri="{386F3935-93C4-4BCD-93E2-E3B085C9AB24}">
+                <p16:designElem xmlns:p16="http://schemas.microsoft.com/office/powerpoint/2015/main" val="1"/>
+              </p:ext>
+            </p:extLst>
+          </p:nvPr>
+        </p:nvSpPr>
+        <p:spPr>
+          <a:xfrm>
+            <a:off x="0" y="0"/>
+            <a:ext cx="12192000" cy="6858000"/>
+          </a:xfrm>
+          <a:prstGeom prst="rect">
+            <a:avLst/>
+          </a:prstGeom>
+          <a:solidFill>
+            <a:srgbClr val="3C474C"/>
+          </a:solidFill>
+          <a:ln>
+            <a:noFill/>
+          </a:ln>
+        </p:spPr>
+        <p:style>
+          <a:lnRef idx="2">
+            <a:schemeClr val="accent1">
+              <a:shade val="50000"/>
+            </a:schemeClr>
+          </a:lnRef>
+          <a:fillRef idx="1">
+            <a:schemeClr val="accent1"/>
+          </a:fillRef>
+          <a:effectRef idx="0">
+            <a:schemeClr val="accent1"/>
+          </a:effectRef>
+          <a:fontRef idx="minor">
+            <a:schemeClr val="lt1"/>
+          </a:fontRef>
+        </p:style>
+        <p:txBody>
+          <a:bodyPr rtlCol="0" anchor="ctr"/>
+          <a:lstStyle/>
+          <a:p>
+            <a:pPr algn="ctr"/>
+            <a:endParaRPr lang="en-US"/>
+          </a:p>
+        </p:txBody>
+      </p:sp>
+      <p:sp>
+        <p:nvSpPr>
+          <p:cNvPr id="2" name="Title 1">
+            <a:extLst>
+              <a:ext uri="{FF2B5EF4-FFF2-40B4-BE49-F238E27FC236}">
+                <a16:creationId xmlns:a16="http://schemas.microsoft.com/office/drawing/2014/main" id="{602D2ED4-FB5C-82E1-7B9C-6A68CFD2F900}"/>
+              </a:ext>
+            </a:extLst>
+          </p:cNvPr>
+          <p:cNvSpPr>
+            <a:spLocks noGrp="1"/>
+          </p:cNvSpPr>
+          <p:nvPr>
+            <p:ph type="title"/>
+          </p:nvPr>
+        </p:nvSpPr>
+        <p:spPr>
+          <a:xfrm>
+            <a:off x="783771" y="1066800"/>
+            <a:ext cx="5727760" cy="4724400"/>
+          </a:xfrm>
+        </p:spPr>
+        <p:txBody>
+          <a:bodyPr vert="horz" lIns="91440" tIns="45720" rIns="91440" bIns="45720" rtlCol="0" anchor="ctr">
+            <a:normAutofit/>
+          </a:bodyPr>
+          <a:lstStyle/>
+          <a:p>
+            <a:pPr algn="r"/>
+            <a:r>
+              <a:rPr lang="en-US" sz="6600" b="0" kern="1200" cap="all" dirty="0">
+                <a:solidFill>
+                  <a:srgbClr val="FFFFFF">
+                    <a:alpha val="90000"/>
+                  </a:srgbClr>
+                </a:solidFill>
+                <a:latin typeface="+mj-lt"/>
+                <a:ea typeface="+mj-ea"/>
+                <a:cs typeface="+mj-cs"/>
+              </a:rPr>
+              <a:t>Analysis</a:t>
+            </a:r>
+          </a:p>
+        </p:txBody>
+      </p:sp>
+      <p:sp>
+        <p:nvSpPr>
+          <p:cNvPr id="3" name="Text Placeholder 2">
+            <a:extLst>
+              <a:ext uri="{FF2B5EF4-FFF2-40B4-BE49-F238E27FC236}">
+                <a16:creationId xmlns:a16="http://schemas.microsoft.com/office/drawing/2014/main" id="{6193AE9E-B804-C176-87EE-6980273402B1}"/>
+              </a:ext>
+            </a:extLst>
+          </p:cNvPr>
+          <p:cNvSpPr>
+            <a:spLocks noGrp="1"/>
+          </p:cNvSpPr>
+          <p:nvPr>
+            <p:ph type="body" idx="1"/>
+          </p:nvPr>
+        </p:nvSpPr>
+        <p:spPr>
+          <a:xfrm>
+            <a:off x="7534655" y="1066800"/>
+            <a:ext cx="3405015" cy="4724400"/>
+          </a:xfrm>
+          <a:ln w="57150">
+            <a:noFill/>
+          </a:ln>
+        </p:spPr>
+        <p:txBody>
+          <a:bodyPr vert="horz" lIns="91440" tIns="45720" rIns="91440" bIns="45720" rtlCol="0" anchor="ctr">
+            <a:normAutofit/>
+          </a:bodyPr>
+          <a:lstStyle/>
+          <a:p>
+            <a:endParaRPr lang="en-US" sz="2800">
+              <a:solidFill>
+                <a:srgbClr val="FFFFFF"/>
+              </a:solidFill>
+            </a:endParaRPr>
+          </a:p>
+        </p:txBody>
+      </p:sp>
+      <p:sp>
+        <p:nvSpPr>
+          <p:cNvPr id="18" name="Rectangle 17">
+            <a:extLst>
+              <a:ext uri="{FF2B5EF4-FFF2-40B4-BE49-F238E27FC236}">
+                <a16:creationId xmlns:a16="http://schemas.microsoft.com/office/drawing/2014/main" id="{FC566AEA-B9FB-8050-A478-263564A25E2A}"/>
+              </a:ext>
+              <a:ext uri="{C183D7F6-B498-43B3-948B-1728B52AA6E4}">
+                <adec:decorative xmlns:adec="http://schemas.microsoft.com/office/drawing/2017/decorative" val="1"/>
+              </a:ext>
+            </a:extLst>
+          </p:cNvPr>
+          <p:cNvSpPr>
+            <a:spLocks noGrp="1" noRot="1" noChangeAspect="1" noMove="1" noResize="1" noEditPoints="1" noAdjustHandles="1" noChangeArrowheads="1" noChangeShapeType="1" noTextEdit="1"/>
+          </p:cNvSpPr>
+          <p:nvPr>
+            <p:extLst>
+              <p:ext uri="{386F3935-93C4-4BCD-93E2-E3B085C9AB24}">
+                <p16:designElem xmlns:p16="http://schemas.microsoft.com/office/powerpoint/2015/main" val="1"/>
+              </p:ext>
+            </p:extLst>
+          </p:nvPr>
+        </p:nvSpPr>
+        <p:spPr>
+          <a:xfrm rot="16200000">
+            <a:off x="5171433" y="3396996"/>
+            <a:ext cx="3703320" cy="64008"/>
+          </a:xfrm>
+          <a:prstGeom prst="rect">
+            <a:avLst/>
+          </a:prstGeom>
+          <a:solidFill>
+            <a:schemeClr val="accent1"/>
+          </a:solidFill>
+          <a:ln>
+            <a:noFill/>
+          </a:ln>
+          <a:effectLst/>
+        </p:spPr>
+        <p:style>
+          <a:lnRef idx="1">
+            <a:schemeClr val="accent1"/>
+          </a:lnRef>
+          <a:fillRef idx="3">
+            <a:schemeClr val="accent1"/>
+          </a:fillRef>
+          <a:effectRef idx="2">
+            <a:schemeClr val="accent1"/>
+          </a:effectRef>
+          <a:fontRef idx="minor">
+            <a:schemeClr val="lt1"/>
+          </a:fontRef>
+        </p:style>
+        <p:txBody>
+          <a:bodyPr/>
+          <a:lstStyle/>
+          <a:p>
+            <a:endParaRPr lang="en-GB"/>
+          </a:p>
+        </p:txBody>
+      </p:sp>
+    </p:spTree>
+    <p:extLst>
+      <p:ext uri="{BB962C8B-B14F-4D97-AF65-F5344CB8AC3E}">
+        <p14:creationId xmlns:p14="http://schemas.microsoft.com/office/powerpoint/2010/main" val="2849048717"/>
+      </p:ext>
+    </p:extLst>
+  </p:cSld>
+  <p:clrMapOvr>
+    <a:overrideClrMapping bg1="dk1" tx1="lt1" bg2="dk2" tx2="lt2" accent1="accent1" accent2="accent2" accent3="accent3" accent4="accent4" accent5="accent5" accent6="accent6" hlink="hlink" folHlink="folHlink"/>
+  </p:clrMapOvr>
+</p:sld>
+</file>
+
+<file path=ppt/slides/slide18.xml><?xml version="1.0" encoding="utf-8"?>
+<p:sld xmlns:a="http://schemas.openxmlformats.org/drawingml/2006/main" xmlns:r="http://schemas.openxmlformats.org/officeDocument/2006/relationships" xmlns:p="http://schemas.openxmlformats.org/presentationml/2006/main">
+  <p:cSld>
+    <p:spTree>
+      <p:nvGrpSpPr>
+        <p:cNvPr id="1" name=""/>
+        <p:cNvGrpSpPr/>
+        <p:nvPr/>
+      </p:nvGrpSpPr>
+      <p:grpSpPr>
+        <a:xfrm>
+          <a:off x="0" y="0"/>
+          <a:ext cx="0" cy="0"/>
+          <a:chOff x="0" y="0"/>
+          <a:chExt cx="0" cy="0"/>
+        </a:xfrm>
+      </p:grpSpPr>
+      <p:sp>
+        <p:nvSpPr>
+          <p:cNvPr id="2" name="Title 1">
+            <a:extLst>
+              <a:ext uri="{FF2B5EF4-FFF2-40B4-BE49-F238E27FC236}">
+                <a16:creationId xmlns:a16="http://schemas.microsoft.com/office/drawing/2014/main" id="{DB0080DE-1461-27E8-9F6F-B760B2EFA1BE}"/>
+              </a:ext>
+            </a:extLst>
+          </p:cNvPr>
+          <p:cNvSpPr>
+            <a:spLocks noGrp="1"/>
+          </p:cNvSpPr>
+          <p:nvPr>
+            <p:ph type="title"/>
+          </p:nvPr>
+        </p:nvSpPr>
+        <p:spPr/>
+        <p:txBody>
+          <a:bodyPr/>
+          <a:lstStyle/>
+          <a:p>
+            <a:r>
+              <a:rPr lang="en-GB" dirty="0"/>
+              <a:t>Analysis</a:t>
+            </a:r>
+          </a:p>
+        </p:txBody>
+      </p:sp>
+      <p:sp>
+        <p:nvSpPr>
+          <p:cNvPr id="3" name="Content Placeholder 2">
+            <a:extLst>
+              <a:ext uri="{FF2B5EF4-FFF2-40B4-BE49-F238E27FC236}">
+                <a16:creationId xmlns:a16="http://schemas.microsoft.com/office/drawing/2014/main" id="{A73B3A22-2419-9F95-B937-73E28C51DBCA}"/>
+              </a:ext>
+            </a:extLst>
+          </p:cNvPr>
+          <p:cNvSpPr>
+            <a:spLocks noGrp="1"/>
+          </p:cNvSpPr>
+          <p:nvPr>
+            <p:ph idx="1"/>
+          </p:nvPr>
+        </p:nvSpPr>
+        <p:spPr/>
+        <p:txBody>
+          <a:bodyPr/>
+          <a:lstStyle/>
+          <a:p>
+            <a:endParaRPr lang="en-GB"/>
+          </a:p>
+        </p:txBody>
+      </p:sp>
+    </p:spTree>
+    <p:extLst>
+      <p:ext uri="{BB962C8B-B14F-4D97-AF65-F5344CB8AC3E}">
+        <p14:creationId xmlns:p14="http://schemas.microsoft.com/office/powerpoint/2010/main" val="2494100945"/>
+      </p:ext>
+    </p:extLst>
+  </p:cSld>
+  <p:clrMapOvr>
+    <a:masterClrMapping/>
+  </p:clrMapOvr>
+</p:sld>
+</file>
+
+<file path=ppt/slides/slide19.xml><?xml version="1.0" encoding="utf-8"?>
+<p:sld xmlns:a="http://schemas.openxmlformats.org/drawingml/2006/main" xmlns:r="http://schemas.openxmlformats.org/officeDocument/2006/relationships" xmlns:p="http://schemas.openxmlformats.org/presentationml/2006/main">
+  <p:cSld>
+    <p:bg>
+      <p:bgPr>
+        <a:solidFill>
+          <a:schemeClr val="bg2"/>
+        </a:solidFill>
+        <a:effectLst/>
+      </p:bgPr>
+    </p:bg>
+    <p:spTree>
+      <p:nvGrpSpPr>
+        <p:cNvPr id="1" name="">
+          <a:extLst>
+            <a:ext uri="{FF2B5EF4-FFF2-40B4-BE49-F238E27FC236}">
+              <a16:creationId xmlns:a16="http://schemas.microsoft.com/office/drawing/2014/main" id="{A1977BFA-87C6-3D0B-7DCA-6CD532D6E2E2}"/>
+            </a:ext>
+          </a:extLst>
+        </p:cNvPr>
+        <p:cNvGrpSpPr/>
+        <p:nvPr/>
+      </p:nvGrpSpPr>
+      <p:grpSpPr>
+        <a:xfrm>
+          <a:off x="0" y="0"/>
+          <a:ext cx="0" cy="0"/>
+          <a:chOff x="0" y="0"/>
+          <a:chExt cx="0" cy="0"/>
+        </a:xfrm>
+      </p:grpSpPr>
+      <p:sp>
+        <p:nvSpPr>
+          <p:cNvPr id="8" name="Rectangle 7">
+            <a:extLst>
+              <a:ext uri="{FF2B5EF4-FFF2-40B4-BE49-F238E27FC236}">
+                <a16:creationId xmlns:a16="http://schemas.microsoft.com/office/drawing/2014/main" id="{CC445E47-D8FB-79FD-BB62-5A26EA8DEF24}"/>
+              </a:ext>
+              <a:ext uri="{C183D7F6-B498-43B3-948B-1728B52AA6E4}">
+                <adec:decorative xmlns:adec="http://schemas.microsoft.com/office/drawing/2017/decorative" val="1"/>
+              </a:ext>
+            </a:extLst>
+          </p:cNvPr>
+          <p:cNvSpPr>
+            <a:spLocks noGrp="1" noRot="1" noChangeAspect="1" noMove="1" noResize="1" noEditPoints="1" noAdjustHandles="1" noChangeArrowheads="1" noChangeShapeType="1" noTextEdit="1"/>
+          </p:cNvSpPr>
+          <p:nvPr>
+            <p:extLst>
+              <p:ext uri="{386F3935-93C4-4BCD-93E2-E3B085C9AB24}">
+                <p16:designElem xmlns:p16="http://schemas.microsoft.com/office/powerpoint/2015/main" val="1"/>
+              </p:ext>
+            </p:extLst>
+          </p:nvPr>
+        </p:nvSpPr>
+        <p:spPr>
+          <a:xfrm>
+            <a:off x="446534" y="457200"/>
+            <a:ext cx="3703320" cy="94997"/>
+          </a:xfrm>
+          <a:prstGeom prst="rect">
+            <a:avLst/>
+          </a:prstGeom>
+          <a:solidFill>
+            <a:srgbClr val="465359"/>
+          </a:solidFill>
+          <a:ln>
+            <a:noFill/>
+          </a:ln>
+          <a:effectLst/>
+        </p:spPr>
+        <p:style>
+          <a:lnRef idx="1">
+            <a:schemeClr val="accent1"/>
+          </a:lnRef>
+          <a:fillRef idx="3">
+            <a:schemeClr val="accent1"/>
+          </a:fillRef>
+          <a:effectRef idx="2">
+            <a:schemeClr val="accent1"/>
+          </a:effectRef>
+          <a:fontRef idx="minor">
+            <a:schemeClr val="lt1"/>
+          </a:fontRef>
+        </p:style>
+        <p:txBody>
+          <a:bodyPr/>
+          <a:lstStyle/>
+          <a:p>
+            <a:endParaRPr lang="en-GB"/>
+          </a:p>
+        </p:txBody>
+      </p:sp>
+      <p:sp>
+        <p:nvSpPr>
+          <p:cNvPr id="10" name="Rectangle 9">
+            <a:extLst>
+              <a:ext uri="{FF2B5EF4-FFF2-40B4-BE49-F238E27FC236}">
+                <a16:creationId xmlns:a16="http://schemas.microsoft.com/office/drawing/2014/main" id="{EDEAE655-AA1F-EFEB-57C4-98F53621DC30}"/>
+              </a:ext>
+              <a:ext uri="{C183D7F6-B498-43B3-948B-1728B52AA6E4}">
+                <adec:decorative xmlns:adec="http://schemas.microsoft.com/office/drawing/2017/decorative" val="1"/>
+              </a:ext>
+            </a:extLst>
+          </p:cNvPr>
+          <p:cNvSpPr>
+            <a:spLocks noGrp="1" noRot="1" noChangeAspect="1" noMove="1" noResize="1" noEditPoints="1" noAdjustHandles="1" noChangeArrowheads="1" noChangeShapeType="1" noTextEdit="1"/>
+          </p:cNvSpPr>
+          <p:nvPr>
+            <p:extLst>
+              <p:ext uri="{386F3935-93C4-4BCD-93E2-E3B085C9AB24}">
+                <p16:designElem xmlns:p16="http://schemas.microsoft.com/office/powerpoint/2015/main" val="1"/>
+              </p:ext>
+            </p:extLst>
+          </p:nvPr>
+        </p:nvSpPr>
+        <p:spPr>
+          <a:xfrm>
+            <a:off x="8042147" y="453643"/>
+            <a:ext cx="3703320" cy="98554"/>
+          </a:xfrm>
+          <a:prstGeom prst="rect">
+            <a:avLst/>
+          </a:prstGeom>
+          <a:solidFill>
+            <a:srgbClr val="969FA7"/>
+          </a:solidFill>
+          <a:ln>
+            <a:noFill/>
+          </a:ln>
+          <a:effectLst/>
+        </p:spPr>
+        <p:style>
+          <a:lnRef idx="1">
+            <a:schemeClr val="accent1"/>
+          </a:lnRef>
+          <a:fillRef idx="3">
+            <a:schemeClr val="accent1"/>
+          </a:fillRef>
+          <a:effectRef idx="2">
+            <a:schemeClr val="accent1"/>
+          </a:effectRef>
+          <a:fontRef idx="minor">
+            <a:schemeClr val="lt1"/>
+          </a:fontRef>
+        </p:style>
+        <p:txBody>
+          <a:bodyPr/>
+          <a:lstStyle/>
+          <a:p>
+            <a:endParaRPr lang="en-GB"/>
+          </a:p>
+        </p:txBody>
+      </p:sp>
+      <p:sp>
+        <p:nvSpPr>
+          <p:cNvPr id="12" name="Rectangle 11">
+            <a:extLst>
+              <a:ext uri="{FF2B5EF4-FFF2-40B4-BE49-F238E27FC236}">
+                <a16:creationId xmlns:a16="http://schemas.microsoft.com/office/drawing/2014/main" id="{3DCBA7BA-690A-85E8-C958-5C0532776DAA}"/>
+              </a:ext>
+              <a:ext uri="{C183D7F6-B498-43B3-948B-1728B52AA6E4}">
+                <adec:decorative xmlns:adec="http://schemas.microsoft.com/office/drawing/2017/decorative" val="1"/>
+              </a:ext>
+            </a:extLst>
+          </p:cNvPr>
+          <p:cNvSpPr>
+            <a:spLocks noGrp="1" noRot="1" noChangeAspect="1" noMove="1" noResize="1" noEditPoints="1" noAdjustHandles="1" noChangeArrowheads="1" noChangeShapeType="1" noTextEdit="1"/>
+          </p:cNvSpPr>
+          <p:nvPr>
+            <p:extLst>
+              <p:ext uri="{386F3935-93C4-4BCD-93E2-E3B085C9AB24}">
+                <p16:designElem xmlns:p16="http://schemas.microsoft.com/office/powerpoint/2015/main" val="1"/>
+              </p:ext>
+            </p:extLst>
+          </p:nvPr>
+        </p:nvSpPr>
+        <p:spPr>
+          <a:xfrm>
+            <a:off x="4241830" y="457200"/>
+            <a:ext cx="3703320" cy="91440"/>
+          </a:xfrm>
+          <a:prstGeom prst="rect">
+            <a:avLst/>
+          </a:prstGeom>
+          <a:solidFill>
+            <a:schemeClr val="accent1"/>
+          </a:solidFill>
+          <a:ln>
+            <a:noFill/>
+          </a:ln>
+          <a:effectLst/>
+        </p:spPr>
+        <p:style>
+          <a:lnRef idx="1">
+            <a:schemeClr val="accent1"/>
+          </a:lnRef>
+          <a:fillRef idx="3">
+            <a:schemeClr val="accent1"/>
+          </a:fillRef>
+          <a:effectRef idx="2">
+            <a:schemeClr val="accent1"/>
+          </a:effectRef>
+          <a:fontRef idx="minor">
+            <a:schemeClr val="lt1"/>
+          </a:fontRef>
+        </p:style>
+        <p:txBody>
+          <a:bodyPr/>
+          <a:lstStyle/>
+          <a:p>
+            <a:endParaRPr lang="en-GB"/>
+          </a:p>
+        </p:txBody>
+      </p:sp>
+      <p:sp>
+        <p:nvSpPr>
+          <p:cNvPr id="14" name="Rectangle 13">
+            <a:extLst>
+              <a:ext uri="{FF2B5EF4-FFF2-40B4-BE49-F238E27FC236}">
+                <a16:creationId xmlns:a16="http://schemas.microsoft.com/office/drawing/2014/main" id="{7C603E28-42CB-A9A1-44C4-44C6AA01CE8D}"/>
+              </a:ext>
+              <a:ext uri="{C183D7F6-B498-43B3-948B-1728B52AA6E4}">
+                <adec:decorative xmlns:adec="http://schemas.microsoft.com/office/drawing/2017/decorative" val="1"/>
+              </a:ext>
+            </a:extLst>
+          </p:cNvPr>
+          <p:cNvSpPr>
+            <a:spLocks noGrp="1" noRot="1" noChangeAspect="1" noMove="1" noResize="1" noEditPoints="1" noAdjustHandles="1" noChangeArrowheads="1" noChangeShapeType="1" noTextEdit="1"/>
+          </p:cNvSpPr>
+          <p:nvPr>
+            <p:extLst>
+              <p:ext uri="{386F3935-93C4-4BCD-93E2-E3B085C9AB24}">
+                <p16:designElem xmlns:p16="http://schemas.microsoft.com/office/powerpoint/2015/main" val="1"/>
+              </p:ext>
+            </p:extLst>
+          </p:nvPr>
+        </p:nvSpPr>
+        <p:spPr>
+          <a:xfrm>
+            <a:off x="446534" y="3085764"/>
+            <a:ext cx="11298932" cy="3338149"/>
+          </a:xfrm>
+          <a:prstGeom prst="rect">
+            <a:avLst/>
+          </a:prstGeom>
+          <a:solidFill>
+            <a:srgbClr val="465359"/>
+          </a:solidFill>
+          <a:ln>
+            <a:noFill/>
+          </a:ln>
+          <a:effectLst/>
+        </p:spPr>
+        <p:style>
+          <a:lnRef idx="1">
+            <a:schemeClr val="accent1"/>
+          </a:lnRef>
+          <a:fillRef idx="3">
+            <a:schemeClr val="accent1"/>
+          </a:fillRef>
+          <a:effectRef idx="2">
+            <a:schemeClr val="accent1"/>
+          </a:effectRef>
+          <a:fontRef idx="minor">
+            <a:schemeClr val="lt1"/>
+          </a:fontRef>
+        </p:style>
+        <p:txBody>
+          <a:bodyPr/>
+          <a:lstStyle/>
+          <a:p>
+            <a:endParaRPr lang="en-GB"/>
+          </a:p>
+        </p:txBody>
+      </p:sp>
+      <p:sp>
+        <p:nvSpPr>
+          <p:cNvPr id="16" name="Rectangle 15">
+            <a:extLst>
+              <a:ext uri="{FF2B5EF4-FFF2-40B4-BE49-F238E27FC236}">
+                <a16:creationId xmlns:a16="http://schemas.microsoft.com/office/drawing/2014/main" id="{20442D68-B1FA-8530-562E-31D79B66B75A}"/>
+              </a:ext>
+              <a:ext uri="{C183D7F6-B498-43B3-948B-1728B52AA6E4}">
+                <adec:decorative xmlns:adec="http://schemas.microsoft.com/office/drawing/2017/decorative" val="1"/>
+              </a:ext>
+            </a:extLst>
+          </p:cNvPr>
+          <p:cNvSpPr>
+            <a:spLocks noGrp="1" noRot="1" noChangeAspect="1" noMove="1" noResize="1" noEditPoints="1" noAdjustHandles="1" noChangeArrowheads="1" noChangeShapeType="1" noTextEdit="1"/>
+          </p:cNvSpPr>
+          <p:nvPr>
+            <p:extLst>
+              <p:ext uri="{386F3935-93C4-4BCD-93E2-E3B085C9AB24}">
+                <p16:designElem xmlns:p16="http://schemas.microsoft.com/office/powerpoint/2015/main" val="1"/>
+              </p:ext>
+            </p:extLst>
+          </p:nvPr>
+        </p:nvSpPr>
+        <p:spPr>
+          <a:xfrm>
+            <a:off x="0" y="0"/>
+            <a:ext cx="12192000" cy="6858000"/>
+          </a:xfrm>
+          <a:prstGeom prst="rect">
+            <a:avLst/>
+          </a:prstGeom>
+          <a:solidFill>
+            <a:srgbClr val="3C474C"/>
+          </a:solidFill>
+          <a:ln>
+            <a:noFill/>
+          </a:ln>
+        </p:spPr>
+        <p:style>
+          <a:lnRef idx="2">
+            <a:schemeClr val="accent1">
+              <a:shade val="50000"/>
+            </a:schemeClr>
+          </a:lnRef>
+          <a:fillRef idx="1">
+            <a:schemeClr val="accent1"/>
+          </a:fillRef>
+          <a:effectRef idx="0">
+            <a:schemeClr val="accent1"/>
+          </a:effectRef>
+          <a:fontRef idx="minor">
+            <a:schemeClr val="lt1"/>
+          </a:fontRef>
+        </p:style>
+        <p:txBody>
+          <a:bodyPr rtlCol="0" anchor="ctr"/>
+          <a:lstStyle/>
+          <a:p>
+            <a:pPr algn="ctr"/>
+            <a:endParaRPr lang="en-US"/>
+          </a:p>
+        </p:txBody>
+      </p:sp>
+      <p:sp>
+        <p:nvSpPr>
+          <p:cNvPr id="2" name="Title 1">
+            <a:extLst>
+              <a:ext uri="{FF2B5EF4-FFF2-40B4-BE49-F238E27FC236}">
+                <a16:creationId xmlns:a16="http://schemas.microsoft.com/office/drawing/2014/main" id="{EF56311F-9336-DFED-5DD7-FDD5331F036B}"/>
+              </a:ext>
+            </a:extLst>
+          </p:cNvPr>
+          <p:cNvSpPr>
+            <a:spLocks noGrp="1"/>
+          </p:cNvSpPr>
+          <p:nvPr>
+            <p:ph type="title"/>
+          </p:nvPr>
+        </p:nvSpPr>
+        <p:spPr>
+          <a:xfrm>
+            <a:off x="783771" y="1066800"/>
+            <a:ext cx="5727760" cy="4724400"/>
+          </a:xfrm>
+        </p:spPr>
+        <p:txBody>
+          <a:bodyPr vert="horz" lIns="91440" tIns="45720" rIns="91440" bIns="45720" rtlCol="0" anchor="ctr">
+            <a:normAutofit/>
+          </a:bodyPr>
+          <a:lstStyle/>
+          <a:p>
+            <a:pPr algn="r"/>
+            <a:r>
+              <a:rPr lang="en-US" sz="6600" b="0" kern="1200" cap="all" dirty="0">
+                <a:solidFill>
+                  <a:srgbClr val="FFFFFF">
+                    <a:alpha val="90000"/>
+                  </a:srgbClr>
+                </a:solidFill>
+                <a:latin typeface="+mj-lt"/>
+                <a:ea typeface="+mj-ea"/>
+                <a:cs typeface="+mj-cs"/>
+              </a:rPr>
+              <a:t>Conclusion</a:t>
+            </a:r>
+          </a:p>
+        </p:txBody>
+      </p:sp>
+      <p:sp>
+        <p:nvSpPr>
+          <p:cNvPr id="3" name="Text Placeholder 2">
+            <a:extLst>
+              <a:ext uri="{FF2B5EF4-FFF2-40B4-BE49-F238E27FC236}">
+                <a16:creationId xmlns:a16="http://schemas.microsoft.com/office/drawing/2014/main" id="{D2489EF7-FD2A-8E54-321F-39DF12FA51CF}"/>
+              </a:ext>
+            </a:extLst>
+          </p:cNvPr>
+          <p:cNvSpPr>
+            <a:spLocks noGrp="1"/>
+          </p:cNvSpPr>
+          <p:nvPr>
+            <p:ph type="body" idx="1"/>
+          </p:nvPr>
+        </p:nvSpPr>
+        <p:spPr>
+          <a:xfrm>
+            <a:off x="7534655" y="1066800"/>
+            <a:ext cx="3405015" cy="4724400"/>
+          </a:xfrm>
+          <a:ln w="57150">
+            <a:noFill/>
+          </a:ln>
+        </p:spPr>
+        <p:txBody>
+          <a:bodyPr vert="horz" lIns="91440" tIns="45720" rIns="91440" bIns="45720" rtlCol="0" anchor="ctr">
+            <a:normAutofit/>
+          </a:bodyPr>
+          <a:lstStyle/>
+          <a:p>
+            <a:endParaRPr lang="en-US" sz="2800">
+              <a:solidFill>
+                <a:srgbClr val="FFFFFF"/>
+              </a:solidFill>
+            </a:endParaRPr>
+          </a:p>
+        </p:txBody>
+      </p:sp>
+      <p:sp>
+        <p:nvSpPr>
+          <p:cNvPr id="18" name="Rectangle 17">
+            <a:extLst>
+              <a:ext uri="{FF2B5EF4-FFF2-40B4-BE49-F238E27FC236}">
+                <a16:creationId xmlns:a16="http://schemas.microsoft.com/office/drawing/2014/main" id="{CE5032E8-AE5F-5920-B274-C8487868D4FA}"/>
+              </a:ext>
+              <a:ext uri="{C183D7F6-B498-43B3-948B-1728B52AA6E4}">
+                <adec:decorative xmlns:adec="http://schemas.microsoft.com/office/drawing/2017/decorative" val="1"/>
+              </a:ext>
+            </a:extLst>
+          </p:cNvPr>
+          <p:cNvSpPr>
+            <a:spLocks noGrp="1" noRot="1" noChangeAspect="1" noMove="1" noResize="1" noEditPoints="1" noAdjustHandles="1" noChangeArrowheads="1" noChangeShapeType="1" noTextEdit="1"/>
+          </p:cNvSpPr>
+          <p:nvPr>
+            <p:extLst>
+              <p:ext uri="{386F3935-93C4-4BCD-93E2-E3B085C9AB24}">
+                <p16:designElem xmlns:p16="http://schemas.microsoft.com/office/powerpoint/2015/main" val="1"/>
+              </p:ext>
+            </p:extLst>
+          </p:nvPr>
+        </p:nvSpPr>
+        <p:spPr>
+          <a:xfrm rot="16200000">
+            <a:off x="5171433" y="3396996"/>
+            <a:ext cx="3703320" cy="64008"/>
+          </a:xfrm>
+          <a:prstGeom prst="rect">
+            <a:avLst/>
+          </a:prstGeom>
+          <a:solidFill>
+            <a:schemeClr val="accent1"/>
+          </a:solidFill>
+          <a:ln>
+            <a:noFill/>
+          </a:ln>
+          <a:effectLst/>
+        </p:spPr>
+        <p:style>
+          <a:lnRef idx="1">
+            <a:schemeClr val="accent1"/>
+          </a:lnRef>
+          <a:fillRef idx="3">
+            <a:schemeClr val="accent1"/>
+          </a:fillRef>
+          <a:effectRef idx="2">
+            <a:schemeClr val="accent1"/>
+          </a:effectRef>
+          <a:fontRef idx="minor">
+            <a:schemeClr val="lt1"/>
+          </a:fontRef>
+        </p:style>
+        <p:txBody>
+          <a:bodyPr/>
+          <a:lstStyle/>
+          <a:p>
+            <a:endParaRPr lang="en-GB"/>
+          </a:p>
+        </p:txBody>
+      </p:sp>
+    </p:spTree>
+    <p:extLst>
+      <p:ext uri="{BB962C8B-B14F-4D97-AF65-F5344CB8AC3E}">
+        <p14:creationId xmlns:p14="http://schemas.microsoft.com/office/powerpoint/2010/main" val="3930870267"/>
+      </p:ext>
+    </p:extLst>
+  </p:cSld>
+  <p:clrMapOvr>
+    <a:overrideClrMapping bg1="dk1" tx1="lt1" bg2="dk2" tx2="lt2" accent1="accent1" accent2="accent2" accent3="accent3" accent4="accent4" accent5="accent5" accent6="accent6" hlink="hlink" folHlink="folHlink"/>
+  </p:clrMapOvr>
+</p:sld>
+</file>
+
 <file path=ppt/slides/slide2.xml><?xml version="1.0" encoding="utf-8"?>
 <p:sld xmlns:a="http://schemas.openxmlformats.org/drawingml/2006/main" xmlns:r="http://schemas.openxmlformats.org/officeDocument/2006/relationships" xmlns:p="http://schemas.openxmlformats.org/presentationml/2006/main">
   <p:cSld>
@@ -4588,6 +7087,89 @@
 </p:sld>
 </file>
 
+<file path=ppt/slides/slide20.xml><?xml version="1.0" encoding="utf-8"?>
+<p:sld xmlns:a="http://schemas.openxmlformats.org/drawingml/2006/main" xmlns:r="http://schemas.openxmlformats.org/officeDocument/2006/relationships" xmlns:p="http://schemas.openxmlformats.org/presentationml/2006/main">
+  <p:cSld>
+    <p:spTree>
+      <p:nvGrpSpPr>
+        <p:cNvPr id="1" name=""/>
+        <p:cNvGrpSpPr/>
+        <p:nvPr/>
+      </p:nvGrpSpPr>
+      <p:grpSpPr>
+        <a:xfrm>
+          <a:off x="0" y="0"/>
+          <a:ext cx="0" cy="0"/>
+          <a:chOff x="0" y="0"/>
+          <a:chExt cx="0" cy="0"/>
+        </a:xfrm>
+      </p:grpSpPr>
+      <p:sp>
+        <p:nvSpPr>
+          <p:cNvPr id="2" name="Title 1">
+            <a:extLst>
+              <a:ext uri="{FF2B5EF4-FFF2-40B4-BE49-F238E27FC236}">
+                <a16:creationId xmlns:a16="http://schemas.microsoft.com/office/drawing/2014/main" id="{DC91E690-8E28-FFBC-7F47-AD6B3CBB3EB9}"/>
+              </a:ext>
+            </a:extLst>
+          </p:cNvPr>
+          <p:cNvSpPr>
+            <a:spLocks noGrp="1"/>
+          </p:cNvSpPr>
+          <p:nvPr>
+            <p:ph type="title"/>
+          </p:nvPr>
+        </p:nvSpPr>
+        <p:spPr/>
+        <p:txBody>
+          <a:bodyPr/>
+          <a:lstStyle/>
+          <a:p>
+            <a:r>
+              <a:rPr lang="en-GB" dirty="0"/>
+              <a:t>Conclusion</a:t>
+            </a:r>
+          </a:p>
+        </p:txBody>
+      </p:sp>
+      <p:sp>
+        <p:nvSpPr>
+          <p:cNvPr id="3" name="Content Placeholder 2">
+            <a:extLst>
+              <a:ext uri="{FF2B5EF4-FFF2-40B4-BE49-F238E27FC236}">
+                <a16:creationId xmlns:a16="http://schemas.microsoft.com/office/drawing/2014/main" id="{C0D506B2-6FEA-AB53-D3C3-A753EC2C2FC9}"/>
+              </a:ext>
+            </a:extLst>
+          </p:cNvPr>
+          <p:cNvSpPr>
+            <a:spLocks noGrp="1"/>
+          </p:cNvSpPr>
+          <p:nvPr>
+            <p:ph idx="1"/>
+          </p:nvPr>
+        </p:nvSpPr>
+        <p:spPr/>
+        <p:txBody>
+          <a:bodyPr/>
+          <a:lstStyle/>
+          <a:p>
+            <a:endParaRPr lang="en-GB"/>
+          </a:p>
+        </p:txBody>
+      </p:sp>
+    </p:spTree>
+    <p:extLst>
+      <p:ext uri="{BB962C8B-B14F-4D97-AF65-F5344CB8AC3E}">
+        <p14:creationId xmlns:p14="http://schemas.microsoft.com/office/powerpoint/2010/main" val="2128849783"/>
+      </p:ext>
+    </p:extLst>
+  </p:cSld>
+  <p:clrMapOvr>
+    <a:masterClrMapping/>
+  </p:clrMapOvr>
+</p:sld>
+</file>
+
 <file path=ppt/slides/slide3.xml><?xml version="1.0" encoding="utf-8"?>
 <p:sld xmlns:a="http://schemas.openxmlformats.org/drawingml/2006/main" xmlns:r="http://schemas.openxmlformats.org/officeDocument/2006/relationships" xmlns:p="http://schemas.openxmlformats.org/presentationml/2006/main">
   <p:cSld>
@@ -4695,9 +7277,23 @@
 <file path=ppt/slides/slide4.xml><?xml version="1.0" encoding="utf-8"?>
 <p:sld xmlns:a="http://schemas.openxmlformats.org/drawingml/2006/main" xmlns:r="http://schemas.openxmlformats.org/officeDocument/2006/relationships" xmlns:p="http://schemas.openxmlformats.org/presentationml/2006/main">
   <p:cSld>
+    <p:bg>
+      <p:bgPr>
+        <a:solidFill>
+          <a:schemeClr val="bg2"/>
+        </a:solidFill>
+        <a:effectLst/>
+      </p:bgPr>
+    </p:bg>
     <p:spTree>
       <p:nvGrpSpPr>
-        <p:cNvPr id="1" name=""/>
+        <p:cNvPr id="1" name="">
+          <a:extLst>
+            <a:ext uri="{FF2B5EF4-FFF2-40B4-BE49-F238E27FC236}">
+              <a16:creationId xmlns:a16="http://schemas.microsoft.com/office/drawing/2014/main" id="{6C238C8A-5271-E37C-A0C0-07A9E290BA2B}"/>
+            </a:ext>
+          </a:extLst>
+        </p:cNvPr>
         <p:cNvGrpSpPr/>
         <p:nvPr/>
       </p:nvGrpSpPr>
@@ -4711,10 +7307,317 @@
       </p:grpSpPr>
       <p:sp>
         <p:nvSpPr>
+          <p:cNvPr id="8" name="Rectangle 7">
+            <a:extLst>
+              <a:ext uri="{FF2B5EF4-FFF2-40B4-BE49-F238E27FC236}">
+                <a16:creationId xmlns:a16="http://schemas.microsoft.com/office/drawing/2014/main" id="{3B3BF1D6-0F0B-B4EC-7648-84CE25BC64EE}"/>
+              </a:ext>
+              <a:ext uri="{C183D7F6-B498-43B3-948B-1728B52AA6E4}">
+                <adec:decorative xmlns:adec="http://schemas.microsoft.com/office/drawing/2017/decorative" val="1"/>
+              </a:ext>
+            </a:extLst>
+          </p:cNvPr>
+          <p:cNvSpPr>
+            <a:spLocks noGrp="1" noRot="1" noChangeAspect="1" noMove="1" noResize="1" noEditPoints="1" noAdjustHandles="1" noChangeArrowheads="1" noChangeShapeType="1" noTextEdit="1"/>
+          </p:cNvSpPr>
+          <p:nvPr>
+            <p:extLst>
+              <p:ext uri="{386F3935-93C4-4BCD-93E2-E3B085C9AB24}">
+                <p16:designElem xmlns:p16="http://schemas.microsoft.com/office/powerpoint/2015/main" val="1"/>
+              </p:ext>
+            </p:extLst>
+          </p:nvPr>
+        </p:nvSpPr>
+        <p:spPr>
+          <a:xfrm>
+            <a:off x="446534" y="457200"/>
+            <a:ext cx="3703320" cy="94997"/>
+          </a:xfrm>
+          <a:prstGeom prst="rect">
+            <a:avLst/>
+          </a:prstGeom>
+          <a:solidFill>
+            <a:srgbClr val="465359"/>
+          </a:solidFill>
+          <a:ln>
+            <a:noFill/>
+          </a:ln>
+          <a:effectLst/>
+        </p:spPr>
+        <p:style>
+          <a:lnRef idx="1">
+            <a:schemeClr val="accent1"/>
+          </a:lnRef>
+          <a:fillRef idx="3">
+            <a:schemeClr val="accent1"/>
+          </a:fillRef>
+          <a:effectRef idx="2">
+            <a:schemeClr val="accent1"/>
+          </a:effectRef>
+          <a:fontRef idx="minor">
+            <a:schemeClr val="lt1"/>
+          </a:fontRef>
+        </p:style>
+        <p:txBody>
+          <a:bodyPr/>
+          <a:lstStyle/>
+          <a:p>
+            <a:endParaRPr lang="en-GB"/>
+          </a:p>
+        </p:txBody>
+      </p:sp>
+      <p:sp>
+        <p:nvSpPr>
+          <p:cNvPr id="10" name="Rectangle 9">
+            <a:extLst>
+              <a:ext uri="{FF2B5EF4-FFF2-40B4-BE49-F238E27FC236}">
+                <a16:creationId xmlns:a16="http://schemas.microsoft.com/office/drawing/2014/main" id="{5767A006-E45F-AF2D-2430-99451EEFC547}"/>
+              </a:ext>
+              <a:ext uri="{C183D7F6-B498-43B3-948B-1728B52AA6E4}">
+                <adec:decorative xmlns:adec="http://schemas.microsoft.com/office/drawing/2017/decorative" val="1"/>
+              </a:ext>
+            </a:extLst>
+          </p:cNvPr>
+          <p:cNvSpPr>
+            <a:spLocks noGrp="1" noRot="1" noChangeAspect="1" noMove="1" noResize="1" noEditPoints="1" noAdjustHandles="1" noChangeArrowheads="1" noChangeShapeType="1" noTextEdit="1"/>
+          </p:cNvSpPr>
+          <p:nvPr>
+            <p:extLst>
+              <p:ext uri="{386F3935-93C4-4BCD-93E2-E3B085C9AB24}">
+                <p16:designElem xmlns:p16="http://schemas.microsoft.com/office/powerpoint/2015/main" val="1"/>
+              </p:ext>
+            </p:extLst>
+          </p:nvPr>
+        </p:nvSpPr>
+        <p:spPr>
+          <a:xfrm>
+            <a:off x="8042147" y="453643"/>
+            <a:ext cx="3703320" cy="98554"/>
+          </a:xfrm>
+          <a:prstGeom prst="rect">
+            <a:avLst/>
+          </a:prstGeom>
+          <a:solidFill>
+            <a:srgbClr val="969FA7"/>
+          </a:solidFill>
+          <a:ln>
+            <a:noFill/>
+          </a:ln>
+          <a:effectLst/>
+        </p:spPr>
+        <p:style>
+          <a:lnRef idx="1">
+            <a:schemeClr val="accent1"/>
+          </a:lnRef>
+          <a:fillRef idx="3">
+            <a:schemeClr val="accent1"/>
+          </a:fillRef>
+          <a:effectRef idx="2">
+            <a:schemeClr val="accent1"/>
+          </a:effectRef>
+          <a:fontRef idx="minor">
+            <a:schemeClr val="lt1"/>
+          </a:fontRef>
+        </p:style>
+        <p:txBody>
+          <a:bodyPr/>
+          <a:lstStyle/>
+          <a:p>
+            <a:endParaRPr lang="en-GB"/>
+          </a:p>
+        </p:txBody>
+      </p:sp>
+      <p:sp>
+        <p:nvSpPr>
+          <p:cNvPr id="12" name="Rectangle 11">
+            <a:extLst>
+              <a:ext uri="{FF2B5EF4-FFF2-40B4-BE49-F238E27FC236}">
+                <a16:creationId xmlns:a16="http://schemas.microsoft.com/office/drawing/2014/main" id="{758C5C09-951C-AF1F-EE01-C256AB586741}"/>
+              </a:ext>
+              <a:ext uri="{C183D7F6-B498-43B3-948B-1728B52AA6E4}">
+                <adec:decorative xmlns:adec="http://schemas.microsoft.com/office/drawing/2017/decorative" val="1"/>
+              </a:ext>
+            </a:extLst>
+          </p:cNvPr>
+          <p:cNvSpPr>
+            <a:spLocks noGrp="1" noRot="1" noChangeAspect="1" noMove="1" noResize="1" noEditPoints="1" noAdjustHandles="1" noChangeArrowheads="1" noChangeShapeType="1" noTextEdit="1"/>
+          </p:cNvSpPr>
+          <p:nvPr>
+            <p:extLst>
+              <p:ext uri="{386F3935-93C4-4BCD-93E2-E3B085C9AB24}">
+                <p16:designElem xmlns:p16="http://schemas.microsoft.com/office/powerpoint/2015/main" val="1"/>
+              </p:ext>
+            </p:extLst>
+          </p:nvPr>
+        </p:nvSpPr>
+        <p:spPr>
+          <a:xfrm>
+            <a:off x="4241830" y="457200"/>
+            <a:ext cx="3703320" cy="91440"/>
+          </a:xfrm>
+          <a:prstGeom prst="rect">
+            <a:avLst/>
+          </a:prstGeom>
+          <a:solidFill>
+            <a:schemeClr val="accent1"/>
+          </a:solidFill>
+          <a:ln>
+            <a:noFill/>
+          </a:ln>
+          <a:effectLst/>
+        </p:spPr>
+        <p:style>
+          <a:lnRef idx="1">
+            <a:schemeClr val="accent1"/>
+          </a:lnRef>
+          <a:fillRef idx="3">
+            <a:schemeClr val="accent1"/>
+          </a:fillRef>
+          <a:effectRef idx="2">
+            <a:schemeClr val="accent1"/>
+          </a:effectRef>
+          <a:fontRef idx="minor">
+            <a:schemeClr val="lt1"/>
+          </a:fontRef>
+        </p:style>
+        <p:txBody>
+          <a:bodyPr/>
+          <a:lstStyle/>
+          <a:p>
+            <a:endParaRPr lang="en-GB"/>
+          </a:p>
+        </p:txBody>
+      </p:sp>
+      <p:sp>
+        <p:nvSpPr>
+          <p:cNvPr id="14" name="Rectangle 13">
+            <a:extLst>
+              <a:ext uri="{FF2B5EF4-FFF2-40B4-BE49-F238E27FC236}">
+                <a16:creationId xmlns:a16="http://schemas.microsoft.com/office/drawing/2014/main" id="{C5EAD15C-9212-6644-2BE0-39BFBE86704E}"/>
+              </a:ext>
+              <a:ext uri="{C183D7F6-B498-43B3-948B-1728B52AA6E4}">
+                <adec:decorative xmlns:adec="http://schemas.microsoft.com/office/drawing/2017/decorative" val="1"/>
+              </a:ext>
+            </a:extLst>
+          </p:cNvPr>
+          <p:cNvSpPr>
+            <a:spLocks noGrp="1" noRot="1" noChangeAspect="1" noMove="1" noResize="1" noEditPoints="1" noAdjustHandles="1" noChangeArrowheads="1" noChangeShapeType="1" noTextEdit="1"/>
+          </p:cNvSpPr>
+          <p:nvPr>
+            <p:extLst>
+              <p:ext uri="{386F3935-93C4-4BCD-93E2-E3B085C9AB24}">
+                <p16:designElem xmlns:p16="http://schemas.microsoft.com/office/powerpoint/2015/main" val="1"/>
+              </p:ext>
+            </p:extLst>
+          </p:nvPr>
+        </p:nvSpPr>
+        <p:spPr>
+          <a:xfrm>
+            <a:off x="446534" y="3085764"/>
+            <a:ext cx="11298932" cy="3338149"/>
+          </a:xfrm>
+          <a:prstGeom prst="rect">
+            <a:avLst/>
+          </a:prstGeom>
+          <a:solidFill>
+            <a:srgbClr val="465359"/>
+          </a:solidFill>
+          <a:ln>
+            <a:noFill/>
+          </a:ln>
+          <a:effectLst/>
+        </p:spPr>
+        <p:style>
+          <a:lnRef idx="1">
+            <a:schemeClr val="accent1"/>
+          </a:lnRef>
+          <a:fillRef idx="3">
+            <a:schemeClr val="accent1"/>
+          </a:fillRef>
+          <a:effectRef idx="2">
+            <a:schemeClr val="accent1"/>
+          </a:effectRef>
+          <a:fontRef idx="minor">
+            <a:schemeClr val="lt1"/>
+          </a:fontRef>
+        </p:style>
+        <p:txBody>
+          <a:bodyPr/>
+          <a:lstStyle/>
+          <a:p>
+            <a:endParaRPr lang="en-GB"/>
+          </a:p>
+        </p:txBody>
+      </p:sp>
+      <p:sp>
+        <p:nvSpPr>
+          <p:cNvPr id="16" name="Rectangle 15">
+            <a:extLst>
+              <a:ext uri="{FF2B5EF4-FFF2-40B4-BE49-F238E27FC236}">
+                <a16:creationId xmlns:a16="http://schemas.microsoft.com/office/drawing/2014/main" id="{0D294639-5F36-045F-6953-D59E36FD8266}"/>
+              </a:ext>
+              <a:ext uri="{C183D7F6-B498-43B3-948B-1728B52AA6E4}">
+                <adec:decorative xmlns:adec="http://schemas.microsoft.com/office/drawing/2017/decorative" val="1"/>
+              </a:ext>
+            </a:extLst>
+          </p:cNvPr>
+          <p:cNvSpPr>
+            <a:spLocks noGrp="1" noRot="1" noChangeAspect="1" noMove="1" noResize="1" noEditPoints="1" noAdjustHandles="1" noChangeArrowheads="1" noChangeShapeType="1" noTextEdit="1"/>
+          </p:cNvSpPr>
+          <p:nvPr>
+            <p:extLst>
+              <p:ext uri="{386F3935-93C4-4BCD-93E2-E3B085C9AB24}">
+                <p16:designElem xmlns:p16="http://schemas.microsoft.com/office/powerpoint/2015/main" val="1"/>
+              </p:ext>
+            </p:extLst>
+          </p:nvPr>
+        </p:nvSpPr>
+        <p:spPr>
+          <a:xfrm>
+            <a:off x="0" y="0"/>
+            <a:ext cx="12192000" cy="6858000"/>
+          </a:xfrm>
+          <a:prstGeom prst="rect">
+            <a:avLst/>
+          </a:prstGeom>
+          <a:solidFill>
+            <a:srgbClr val="3C474C"/>
+          </a:solidFill>
+          <a:ln>
+            <a:noFill/>
+          </a:ln>
+        </p:spPr>
+        <p:style>
+          <a:lnRef idx="2">
+            <a:schemeClr val="accent1">
+              <a:shade val="50000"/>
+            </a:schemeClr>
+          </a:lnRef>
+          <a:fillRef idx="1">
+            <a:schemeClr val="accent1"/>
+          </a:fillRef>
+          <a:effectRef idx="0">
+            <a:schemeClr val="accent1"/>
+          </a:effectRef>
+          <a:fontRef idx="minor">
+            <a:schemeClr val="lt1"/>
+          </a:fontRef>
+        </p:style>
+        <p:txBody>
+          <a:bodyPr rtlCol="0" anchor="ctr"/>
+          <a:lstStyle/>
+          <a:p>
+            <a:pPr algn="ctr"/>
+            <a:endParaRPr lang="en-US"/>
+          </a:p>
+        </p:txBody>
+      </p:sp>
+      <p:sp>
+        <p:nvSpPr>
           <p:cNvPr id="2" name="Title 1">
             <a:extLst>
               <a:ext uri="{FF2B5EF4-FFF2-40B4-BE49-F238E27FC236}">
-                <a16:creationId xmlns:a16="http://schemas.microsoft.com/office/drawing/2014/main" id="{1571B734-13E9-4FFB-B139-9D9332F7CE82}"/>
+                <a16:creationId xmlns:a16="http://schemas.microsoft.com/office/drawing/2014/main" id="{E87F4A2D-BEAA-EA3B-C114-4051BB77C46D}"/>
               </a:ext>
             </a:extLst>
           </p:cNvPr>
@@ -4725,73 +7628,144 @@
             <p:ph type="title"/>
           </p:nvPr>
         </p:nvSpPr>
-        <p:spPr/>
+        <p:spPr>
+          <a:xfrm>
+            <a:off x="783771" y="1066800"/>
+            <a:ext cx="5727760" cy="4724400"/>
+          </a:xfrm>
+        </p:spPr>
+        <p:txBody>
+          <a:bodyPr vert="horz" lIns="91440" tIns="45720" rIns="91440" bIns="45720" rtlCol="0" anchor="ctr">
+            <a:normAutofit/>
+          </a:bodyPr>
+          <a:lstStyle/>
+          <a:p>
+            <a:pPr algn="r"/>
+            <a:r>
+              <a:rPr lang="en-US" sz="6600" b="0" kern="1200" cap="all" dirty="0">
+                <a:solidFill>
+                  <a:srgbClr val="FFFFFF">
+                    <a:alpha val="90000"/>
+                  </a:srgbClr>
+                </a:solidFill>
+                <a:latin typeface="+mj-lt"/>
+                <a:ea typeface="+mj-ea"/>
+                <a:cs typeface="+mj-cs"/>
+              </a:rPr>
+              <a:t>Data</a:t>
+            </a:r>
+          </a:p>
+        </p:txBody>
+      </p:sp>
+      <p:sp>
+        <p:nvSpPr>
+          <p:cNvPr id="3" name="Text Placeholder 2">
+            <a:extLst>
+              <a:ext uri="{FF2B5EF4-FFF2-40B4-BE49-F238E27FC236}">
+                <a16:creationId xmlns:a16="http://schemas.microsoft.com/office/drawing/2014/main" id="{21AB2F86-09A7-9D64-3768-23F73C9C4E95}"/>
+              </a:ext>
+            </a:extLst>
+          </p:cNvPr>
+          <p:cNvSpPr>
+            <a:spLocks noGrp="1"/>
+          </p:cNvSpPr>
+          <p:nvPr>
+            <p:ph type="body" idx="1"/>
+          </p:nvPr>
+        </p:nvSpPr>
+        <p:spPr>
+          <a:xfrm>
+            <a:off x="7534655" y="1066800"/>
+            <a:ext cx="3405015" cy="4724400"/>
+          </a:xfrm>
+          <a:ln w="57150">
+            <a:noFill/>
+          </a:ln>
+        </p:spPr>
+        <p:txBody>
+          <a:bodyPr vert="horz" lIns="91440" tIns="45720" rIns="91440" bIns="45720" rtlCol="0" anchor="ctr">
+            <a:normAutofit/>
+          </a:bodyPr>
+          <a:lstStyle/>
+          <a:p>
+            <a:endParaRPr lang="en-US" sz="2800">
+              <a:solidFill>
+                <a:srgbClr val="FFFFFF"/>
+              </a:solidFill>
+            </a:endParaRPr>
+          </a:p>
+        </p:txBody>
+      </p:sp>
+      <p:sp>
+        <p:nvSpPr>
+          <p:cNvPr id="18" name="Rectangle 17">
+            <a:extLst>
+              <a:ext uri="{FF2B5EF4-FFF2-40B4-BE49-F238E27FC236}">
+                <a16:creationId xmlns:a16="http://schemas.microsoft.com/office/drawing/2014/main" id="{778FA4B2-7ABF-F1DE-6431-EB57EABE5032}"/>
+              </a:ext>
+              <a:ext uri="{C183D7F6-B498-43B3-948B-1728B52AA6E4}">
+                <adec:decorative xmlns:adec="http://schemas.microsoft.com/office/drawing/2017/decorative" val="1"/>
+              </a:ext>
+            </a:extLst>
+          </p:cNvPr>
+          <p:cNvSpPr>
+            <a:spLocks noGrp="1" noRot="1" noChangeAspect="1" noMove="1" noResize="1" noEditPoints="1" noAdjustHandles="1" noChangeArrowheads="1" noChangeShapeType="1" noTextEdit="1"/>
+          </p:cNvSpPr>
+          <p:nvPr>
+            <p:extLst>
+              <p:ext uri="{386F3935-93C4-4BCD-93E2-E3B085C9AB24}">
+                <p16:designElem xmlns:p16="http://schemas.microsoft.com/office/powerpoint/2015/main" val="1"/>
+              </p:ext>
+            </p:extLst>
+          </p:nvPr>
+        </p:nvSpPr>
+        <p:spPr>
+          <a:xfrm rot="16200000">
+            <a:off x="5171433" y="3396996"/>
+            <a:ext cx="3703320" cy="64008"/>
+          </a:xfrm>
+          <a:prstGeom prst="rect">
+            <a:avLst/>
+          </a:prstGeom>
+          <a:solidFill>
+            <a:schemeClr val="accent1"/>
+          </a:solidFill>
+          <a:ln>
+            <a:noFill/>
+          </a:ln>
+          <a:effectLst/>
+        </p:spPr>
+        <p:style>
+          <a:lnRef idx="1">
+            <a:schemeClr val="accent1"/>
+          </a:lnRef>
+          <a:fillRef idx="3">
+            <a:schemeClr val="accent1"/>
+          </a:fillRef>
+          <a:effectRef idx="2">
+            <a:schemeClr val="accent1"/>
+          </a:effectRef>
+          <a:fontRef idx="minor">
+            <a:schemeClr val="lt1"/>
+          </a:fontRef>
+        </p:style>
         <p:txBody>
           <a:bodyPr/>
           <a:lstStyle/>
           <a:p>
-            <a:r>
-              <a:rPr lang="en-GB" dirty="0"/>
-              <a:t>Data</a:t>
-            </a:r>
-          </a:p>
-        </p:txBody>
-      </p:sp>
-      <p:sp>
-        <p:nvSpPr>
-          <p:cNvPr id="3" name="Content Placeholder 2">
-            <a:extLst>
-              <a:ext uri="{FF2B5EF4-FFF2-40B4-BE49-F238E27FC236}">
-                <a16:creationId xmlns:a16="http://schemas.microsoft.com/office/drawing/2014/main" id="{6E2684FE-1141-6C95-EB98-25AD299A783C}"/>
-              </a:ext>
-            </a:extLst>
-          </p:cNvPr>
-          <p:cNvSpPr>
-            <a:spLocks noGrp="1"/>
-          </p:cNvSpPr>
-          <p:nvPr>
-            <p:ph idx="1"/>
-          </p:nvPr>
-        </p:nvSpPr>
-        <p:spPr/>
-        <p:txBody>
-          <a:bodyPr/>
-          <a:lstStyle/>
-          <a:p>
-            <a:r>
-              <a:rPr lang="en-GB" dirty="0"/>
-              <a:t>CIFAKE (SIC!)</a:t>
-            </a:r>
-          </a:p>
-          <a:p>
-            <a:r>
-              <a:rPr lang="en-GB" dirty="0"/>
-              <a:t>Generated to mimic CIFAR in resolution &amp; content</a:t>
-            </a:r>
-          </a:p>
-          <a:p>
-            <a:r>
-              <a:rPr lang="en-GB" dirty="0"/>
-              <a:t>50k Images generated via ???; then downscaled to match CIFAR 50k</a:t>
-            </a:r>
-          </a:p>
-          <a:p>
-            <a:r>
-              <a:rPr lang="en-GB" dirty="0"/>
-              <a:t>Only tagged with real/fake; categories not preserved</a:t>
-            </a:r>
+            <a:endParaRPr lang="en-GB"/>
           </a:p>
         </p:txBody>
       </p:sp>
     </p:spTree>
     <p:extLst>
       <p:ext uri="{BB962C8B-B14F-4D97-AF65-F5344CB8AC3E}">
-        <p14:creationId xmlns:p14="http://schemas.microsoft.com/office/powerpoint/2010/main" val="1166131710"/>
+        <p14:creationId xmlns:p14="http://schemas.microsoft.com/office/powerpoint/2010/main" val="3314467603"/>
       </p:ext>
     </p:extLst>
   </p:cSld>
   <p:clrMapOvr>
-    <a:masterClrMapping/>
+    <a:overrideClrMapping bg1="dk1" tx1="lt1" bg2="dk2" tx2="lt2" accent1="accent1" accent2="accent2" accent3="accent3" accent4="accent4" accent5="accent5" accent6="accent6" hlink="hlink" folHlink="folHlink"/>
   </p:clrMapOvr>
 </p:sld>
 </file>
@@ -4818,7 +7792,7 @@
           <p:cNvPr id="2" name="Title 1">
             <a:extLst>
               <a:ext uri="{FF2B5EF4-FFF2-40B4-BE49-F238E27FC236}">
-                <a16:creationId xmlns:a16="http://schemas.microsoft.com/office/drawing/2014/main" id="{96C6BA18-BBBF-E711-2A09-3C12E0EF2163}"/>
+                <a16:creationId xmlns:a16="http://schemas.microsoft.com/office/drawing/2014/main" id="{1571B734-13E9-4FFB-B139-9D9332F7CE82}"/>
               </a:ext>
             </a:extLst>
           </p:cNvPr>
@@ -4836,8 +7810,20 @@
           <a:p>
             <a:r>
               <a:rPr lang="en-GB" dirty="0"/>
-              <a:t>Methods</a:t>
-            </a:r>
+              <a:t>Data – Training</a:t>
+            </a:r>
+            <a:br>
+              <a:rPr lang="en-GB" dirty="0"/>
+            </a:br>
+            <a:r>
+              <a:rPr lang="en-GB" sz="2400" b="1" dirty="0" err="1"/>
+              <a:t>Cifake</a:t>
+            </a:r>
+            <a:r>
+              <a:rPr lang="en-GB" sz="2400" b="1" dirty="0"/>
+              <a:t> (Bird, 2023)</a:t>
+            </a:r>
+            <a:endParaRPr lang="en-GB" b="1" dirty="0"/>
           </a:p>
         </p:txBody>
       </p:sp>
@@ -4846,7 +7832,7 @@
           <p:cNvPr id="3" name="Content Placeholder 2">
             <a:extLst>
               <a:ext uri="{FF2B5EF4-FFF2-40B4-BE49-F238E27FC236}">
-                <a16:creationId xmlns:a16="http://schemas.microsoft.com/office/drawing/2014/main" id="{4AB8A034-E906-0B5B-FD79-61F7AA3D5412}"/>
+                <a16:creationId xmlns:a16="http://schemas.microsoft.com/office/drawing/2014/main" id="{6E2684FE-1141-6C95-EB98-25AD299A783C}"/>
               </a:ext>
             </a:extLst>
           </p:cNvPr>
@@ -4857,26 +7843,55 @@
             <p:ph idx="1"/>
           </p:nvPr>
         </p:nvSpPr>
-        <p:spPr/>
-        <p:txBody>
-          <a:bodyPr/>
-          <a:lstStyle/>
-          <a:p>
-            <a:r>
-              <a:rPr lang="en-GB" dirty="0"/>
-              <a:t>Binary image classification task</a:t>
-            </a:r>
-          </a:p>
-          <a:p>
-            <a:r>
-              <a:rPr lang="en-GB" dirty="0"/>
-              <a:t>Building on CIFAR10 tutorial notebook</a:t>
-            </a:r>
-          </a:p>
-          <a:p>
-            <a:r>
-              <a:rPr lang="en-GB" dirty="0"/>
-              <a:t>Attention: SRM </a:t>
+        <p:spPr>
+          <a:xfrm>
+            <a:off x="581192" y="1890876"/>
+            <a:ext cx="11029615" cy="4084474"/>
+          </a:xfrm>
+        </p:spPr>
+        <p:txBody>
+          <a:bodyPr>
+            <a:normAutofit/>
+          </a:bodyPr>
+          <a:lstStyle/>
+          <a:p>
+            <a:r>
+              <a:rPr lang="en-GB" sz="2800" dirty="0"/>
+              <a:t>60k genuine ‘real’ &amp; 60k synthetic ‘fake’ images (5:1 </a:t>
+            </a:r>
+            <a:r>
+              <a:rPr lang="en-GB" sz="2800" dirty="0" err="1"/>
+              <a:t>train:test</a:t>
+            </a:r>
+            <a:r>
+              <a:rPr lang="en-GB" sz="2800" dirty="0"/>
+              <a:t> split)</a:t>
+            </a:r>
+          </a:p>
+          <a:p>
+            <a:r>
+              <a:rPr lang="en-GB" sz="2800" dirty="0"/>
+              <a:t>Real (1): CIFAR10 dataset (32px, 10 content categories, not preserved)</a:t>
+            </a:r>
+          </a:p>
+          <a:p>
+            <a:r>
+              <a:rPr lang="en-GB" sz="2800" dirty="0"/>
+              <a:t>Fake (0): created via Stable Diffusion v1.4 for CIFAKE (Bird &amp; Lotfi, 2024)</a:t>
+            </a:r>
+          </a:p>
+          <a:p>
+            <a:pPr lvl="1"/>
+            <a:r>
+              <a:rPr lang="en-GB" sz="2400" dirty="0"/>
+              <a:t>Prompts to match CIFAR10 content classes with variation, noise reduction</a:t>
+            </a:r>
+          </a:p>
+          <a:p>
+            <a:pPr lvl="1"/>
+            <a:r>
+              <a:rPr lang="en-GB" sz="2400" dirty="0"/>
+              <a:t>Generated at 512px, downscaled to 32px to match CIFAR10 (full size images not available)</a:t>
             </a:r>
           </a:p>
         </p:txBody>
@@ -4884,7 +7899,7 @@
     </p:spTree>
     <p:extLst>
       <p:ext uri="{BB962C8B-B14F-4D97-AF65-F5344CB8AC3E}">
-        <p14:creationId xmlns:p14="http://schemas.microsoft.com/office/powerpoint/2010/main" val="238722884"/>
+        <p14:creationId xmlns:p14="http://schemas.microsoft.com/office/powerpoint/2010/main" val="1166131710"/>
       </p:ext>
     </p:extLst>
   </p:cSld>
@@ -4899,7 +7914,13 @@
   <p:cSld>
     <p:spTree>
       <p:nvGrpSpPr>
-        <p:cNvPr id="1" name=""/>
+        <p:cNvPr id="1" name="">
+          <a:extLst>
+            <a:ext uri="{FF2B5EF4-FFF2-40B4-BE49-F238E27FC236}">
+              <a16:creationId xmlns:a16="http://schemas.microsoft.com/office/drawing/2014/main" id="{804AF5D1-8133-9ED3-AF09-3C0E41744B92}"/>
+            </a:ext>
+          </a:extLst>
+        </p:cNvPr>
         <p:cNvGrpSpPr/>
         <p:nvPr/>
       </p:nvGrpSpPr>
@@ -4916,7 +7937,7 @@
           <p:cNvPr id="2" name="Title 1">
             <a:extLst>
               <a:ext uri="{FF2B5EF4-FFF2-40B4-BE49-F238E27FC236}">
-                <a16:creationId xmlns:a16="http://schemas.microsoft.com/office/drawing/2014/main" id="{691F774E-1CEA-2EE4-2681-520A8826D91E}"/>
+                <a16:creationId xmlns:a16="http://schemas.microsoft.com/office/drawing/2014/main" id="{DA017F1A-F628-C114-C2AB-FC5565285992}"/>
               </a:ext>
             </a:extLst>
           </p:cNvPr>
@@ -4934,8 +7955,16 @@
           <a:p>
             <a:r>
               <a:rPr lang="en-GB" dirty="0"/>
-              <a:t>Results</a:t>
-            </a:r>
+              <a:t>Data – testing</a:t>
+            </a:r>
+            <a:br>
+              <a:rPr lang="en-GB" dirty="0"/>
+            </a:br>
+            <a:r>
+              <a:rPr lang="en-GB" sz="2400" b="1" dirty="0"/>
+              <a:t>Cifar100 (SIC!)</a:t>
+            </a:r>
+            <a:endParaRPr lang="en-GB" b="1" dirty="0"/>
           </a:p>
         </p:txBody>
       </p:sp>
@@ -4944,7 +7973,7 @@
           <p:cNvPr id="3" name="Content Placeholder 2">
             <a:extLst>
               <a:ext uri="{FF2B5EF4-FFF2-40B4-BE49-F238E27FC236}">
-                <a16:creationId xmlns:a16="http://schemas.microsoft.com/office/drawing/2014/main" id="{10D65002-494C-6EF3-B683-52C41F95C9FE}"/>
+                <a16:creationId xmlns:a16="http://schemas.microsoft.com/office/drawing/2014/main" id="{870497F6-E3EB-D281-5B65-685B0EC62CBE}"/>
               </a:ext>
             </a:extLst>
           </p:cNvPr>
@@ -4955,19 +7984,63 @@
             <p:ph idx="1"/>
           </p:nvPr>
         </p:nvSpPr>
-        <p:spPr/>
-        <p:txBody>
-          <a:bodyPr/>
-          <a:lstStyle/>
-          <a:p>
-            <a:endParaRPr lang="en-GB"/>
+        <p:spPr>
+          <a:xfrm>
+            <a:off x="581192" y="1890876"/>
+            <a:ext cx="11029615" cy="4084474"/>
+          </a:xfrm>
+        </p:spPr>
+        <p:txBody>
+          <a:bodyPr>
+            <a:normAutofit/>
+          </a:bodyPr>
+          <a:lstStyle/>
+          <a:p>
+            <a:r>
+              <a:rPr lang="en-GB" sz="2800" u="sng" dirty="0"/>
+              <a:t>60k genuine ‘real’ &amp; 60k synthetic ‘fake’ images (5:1 </a:t>
+            </a:r>
+            <a:r>
+              <a:rPr lang="en-GB" sz="2800" u="sng" dirty="0" err="1"/>
+              <a:t>train:test</a:t>
+            </a:r>
+            <a:r>
+              <a:rPr lang="en-GB" sz="2800" u="sng" dirty="0"/>
+              <a:t> split)</a:t>
+            </a:r>
+          </a:p>
+          <a:p>
+            <a:r>
+              <a:rPr lang="en-GB" sz="2800" u="sng" dirty="0"/>
+              <a:t>Real: CIFAR10 dataset (32px, 10 content categories, not preserved)</a:t>
+            </a:r>
+          </a:p>
+          <a:p>
+            <a:r>
+              <a:rPr lang="en-GB" sz="2800" u="sng" dirty="0"/>
+              <a:t>Fake: generated via Stable Diffusion v1.4 for CIFAKE (Bird &amp; Lotfi, 2024)</a:t>
+            </a:r>
+          </a:p>
+          <a:p>
+            <a:pPr lvl="1"/>
+            <a:r>
+              <a:rPr lang="en-GB" sz="2400" u="sng" dirty="0"/>
+              <a:t>Prompts to match content classes with variation</a:t>
+            </a:r>
+          </a:p>
+          <a:p>
+            <a:pPr lvl="1"/>
+            <a:r>
+              <a:rPr lang="en-GB" sz="2400" u="sng" dirty="0"/>
+              <a:t>Generated at 512px, then downscaled to 32px to match CIFAR10 (full size images not available)</a:t>
+            </a:r>
           </a:p>
         </p:txBody>
       </p:sp>
     </p:spTree>
     <p:extLst>
       <p:ext uri="{BB962C8B-B14F-4D97-AF65-F5344CB8AC3E}">
-        <p14:creationId xmlns:p14="http://schemas.microsoft.com/office/powerpoint/2010/main" val="3826932345"/>
+        <p14:creationId xmlns:p14="http://schemas.microsoft.com/office/powerpoint/2010/main" val="4223752317"/>
       </p:ext>
     </p:extLst>
   </p:cSld>
@@ -4980,6 +8053,14 @@
 <file path=ppt/slides/slide7.xml><?xml version="1.0" encoding="utf-8"?>
 <p:sld xmlns:a="http://schemas.openxmlformats.org/drawingml/2006/main" xmlns:r="http://schemas.openxmlformats.org/officeDocument/2006/relationships" xmlns:p="http://schemas.openxmlformats.org/presentationml/2006/main">
   <p:cSld>
+    <p:bg>
+      <p:bgPr>
+        <a:solidFill>
+          <a:schemeClr val="bg2"/>
+        </a:solidFill>
+        <a:effectLst/>
+      </p:bgPr>
+    </p:bg>
     <p:spTree>
       <p:nvGrpSpPr>
         <p:cNvPr id="1" name=""/>
@@ -4996,10 +8077,317 @@
       </p:grpSpPr>
       <p:sp>
         <p:nvSpPr>
+          <p:cNvPr id="8" name="Rectangle 7">
+            <a:extLst>
+              <a:ext uri="{FF2B5EF4-FFF2-40B4-BE49-F238E27FC236}">
+                <a16:creationId xmlns:a16="http://schemas.microsoft.com/office/drawing/2014/main" id="{DCF4EB5C-ED25-4675-8255-2F5B12CFFCF0}"/>
+              </a:ext>
+              <a:ext uri="{C183D7F6-B498-43B3-948B-1728B52AA6E4}">
+                <adec:decorative xmlns:adec="http://schemas.microsoft.com/office/drawing/2017/decorative" val="1"/>
+              </a:ext>
+            </a:extLst>
+          </p:cNvPr>
+          <p:cNvSpPr>
+            <a:spLocks noGrp="1" noRot="1" noChangeAspect="1" noMove="1" noResize="1" noEditPoints="1" noAdjustHandles="1" noChangeArrowheads="1" noChangeShapeType="1" noTextEdit="1"/>
+          </p:cNvSpPr>
+          <p:nvPr>
+            <p:extLst>
+              <p:ext uri="{386F3935-93C4-4BCD-93E2-E3B085C9AB24}">
+                <p16:designElem xmlns:p16="http://schemas.microsoft.com/office/powerpoint/2015/main" val="1"/>
+              </p:ext>
+            </p:extLst>
+          </p:nvPr>
+        </p:nvSpPr>
+        <p:spPr>
+          <a:xfrm>
+            <a:off x="446534" y="457200"/>
+            <a:ext cx="3703320" cy="94997"/>
+          </a:xfrm>
+          <a:prstGeom prst="rect">
+            <a:avLst/>
+          </a:prstGeom>
+          <a:solidFill>
+            <a:srgbClr val="465359"/>
+          </a:solidFill>
+          <a:ln>
+            <a:noFill/>
+          </a:ln>
+          <a:effectLst/>
+        </p:spPr>
+        <p:style>
+          <a:lnRef idx="1">
+            <a:schemeClr val="accent1"/>
+          </a:lnRef>
+          <a:fillRef idx="3">
+            <a:schemeClr val="accent1"/>
+          </a:fillRef>
+          <a:effectRef idx="2">
+            <a:schemeClr val="accent1"/>
+          </a:effectRef>
+          <a:fontRef idx="minor">
+            <a:schemeClr val="lt1"/>
+          </a:fontRef>
+        </p:style>
+        <p:txBody>
+          <a:bodyPr/>
+          <a:lstStyle/>
+          <a:p>
+            <a:endParaRPr lang="en-GB"/>
+          </a:p>
+        </p:txBody>
+      </p:sp>
+      <p:sp>
+        <p:nvSpPr>
+          <p:cNvPr id="10" name="Rectangle 9">
+            <a:extLst>
+              <a:ext uri="{FF2B5EF4-FFF2-40B4-BE49-F238E27FC236}">
+                <a16:creationId xmlns:a16="http://schemas.microsoft.com/office/drawing/2014/main" id="{9514EC6E-A557-42A2-BCDC-3ABFFC5E564D}"/>
+              </a:ext>
+              <a:ext uri="{C183D7F6-B498-43B3-948B-1728B52AA6E4}">
+                <adec:decorative xmlns:adec="http://schemas.microsoft.com/office/drawing/2017/decorative" val="1"/>
+              </a:ext>
+            </a:extLst>
+          </p:cNvPr>
+          <p:cNvSpPr>
+            <a:spLocks noGrp="1" noRot="1" noChangeAspect="1" noMove="1" noResize="1" noEditPoints="1" noAdjustHandles="1" noChangeArrowheads="1" noChangeShapeType="1" noTextEdit="1"/>
+          </p:cNvSpPr>
+          <p:nvPr>
+            <p:extLst>
+              <p:ext uri="{386F3935-93C4-4BCD-93E2-E3B085C9AB24}">
+                <p16:designElem xmlns:p16="http://schemas.microsoft.com/office/powerpoint/2015/main" val="1"/>
+              </p:ext>
+            </p:extLst>
+          </p:nvPr>
+        </p:nvSpPr>
+        <p:spPr>
+          <a:xfrm>
+            <a:off x="8042147" y="453643"/>
+            <a:ext cx="3703320" cy="98554"/>
+          </a:xfrm>
+          <a:prstGeom prst="rect">
+            <a:avLst/>
+          </a:prstGeom>
+          <a:solidFill>
+            <a:srgbClr val="969FA7"/>
+          </a:solidFill>
+          <a:ln>
+            <a:noFill/>
+          </a:ln>
+          <a:effectLst/>
+        </p:spPr>
+        <p:style>
+          <a:lnRef idx="1">
+            <a:schemeClr val="accent1"/>
+          </a:lnRef>
+          <a:fillRef idx="3">
+            <a:schemeClr val="accent1"/>
+          </a:fillRef>
+          <a:effectRef idx="2">
+            <a:schemeClr val="accent1"/>
+          </a:effectRef>
+          <a:fontRef idx="minor">
+            <a:schemeClr val="lt1"/>
+          </a:fontRef>
+        </p:style>
+        <p:txBody>
+          <a:bodyPr/>
+          <a:lstStyle/>
+          <a:p>
+            <a:endParaRPr lang="en-GB"/>
+          </a:p>
+        </p:txBody>
+      </p:sp>
+      <p:sp>
+        <p:nvSpPr>
+          <p:cNvPr id="12" name="Rectangle 11">
+            <a:extLst>
+              <a:ext uri="{FF2B5EF4-FFF2-40B4-BE49-F238E27FC236}">
+                <a16:creationId xmlns:a16="http://schemas.microsoft.com/office/drawing/2014/main" id="{905482C9-EB42-4BFE-95BF-7FD661F07657}"/>
+              </a:ext>
+              <a:ext uri="{C183D7F6-B498-43B3-948B-1728B52AA6E4}">
+                <adec:decorative xmlns:adec="http://schemas.microsoft.com/office/drawing/2017/decorative" val="1"/>
+              </a:ext>
+            </a:extLst>
+          </p:cNvPr>
+          <p:cNvSpPr>
+            <a:spLocks noGrp="1" noRot="1" noChangeAspect="1" noMove="1" noResize="1" noEditPoints="1" noAdjustHandles="1" noChangeArrowheads="1" noChangeShapeType="1" noTextEdit="1"/>
+          </p:cNvSpPr>
+          <p:nvPr>
+            <p:extLst>
+              <p:ext uri="{386F3935-93C4-4BCD-93E2-E3B085C9AB24}">
+                <p16:designElem xmlns:p16="http://schemas.microsoft.com/office/powerpoint/2015/main" val="1"/>
+              </p:ext>
+            </p:extLst>
+          </p:nvPr>
+        </p:nvSpPr>
+        <p:spPr>
+          <a:xfrm>
+            <a:off x="4241830" y="457200"/>
+            <a:ext cx="3703320" cy="91440"/>
+          </a:xfrm>
+          <a:prstGeom prst="rect">
+            <a:avLst/>
+          </a:prstGeom>
+          <a:solidFill>
+            <a:schemeClr val="accent1"/>
+          </a:solidFill>
+          <a:ln>
+            <a:noFill/>
+          </a:ln>
+          <a:effectLst/>
+        </p:spPr>
+        <p:style>
+          <a:lnRef idx="1">
+            <a:schemeClr val="accent1"/>
+          </a:lnRef>
+          <a:fillRef idx="3">
+            <a:schemeClr val="accent1"/>
+          </a:fillRef>
+          <a:effectRef idx="2">
+            <a:schemeClr val="accent1"/>
+          </a:effectRef>
+          <a:fontRef idx="minor">
+            <a:schemeClr val="lt1"/>
+          </a:fontRef>
+        </p:style>
+        <p:txBody>
+          <a:bodyPr/>
+          <a:lstStyle/>
+          <a:p>
+            <a:endParaRPr lang="en-GB"/>
+          </a:p>
+        </p:txBody>
+      </p:sp>
+      <p:sp>
+        <p:nvSpPr>
+          <p:cNvPr id="14" name="Rectangle 13">
+            <a:extLst>
+              <a:ext uri="{FF2B5EF4-FFF2-40B4-BE49-F238E27FC236}">
+                <a16:creationId xmlns:a16="http://schemas.microsoft.com/office/drawing/2014/main" id="{7539E646-A625-4A26-86ED-BD90EDD329F7}"/>
+              </a:ext>
+              <a:ext uri="{C183D7F6-B498-43B3-948B-1728B52AA6E4}">
+                <adec:decorative xmlns:adec="http://schemas.microsoft.com/office/drawing/2017/decorative" val="1"/>
+              </a:ext>
+            </a:extLst>
+          </p:cNvPr>
+          <p:cNvSpPr>
+            <a:spLocks noGrp="1" noRot="1" noChangeAspect="1" noMove="1" noResize="1" noEditPoints="1" noAdjustHandles="1" noChangeArrowheads="1" noChangeShapeType="1" noTextEdit="1"/>
+          </p:cNvSpPr>
+          <p:nvPr>
+            <p:extLst>
+              <p:ext uri="{386F3935-93C4-4BCD-93E2-E3B085C9AB24}">
+                <p16:designElem xmlns:p16="http://schemas.microsoft.com/office/powerpoint/2015/main" val="1"/>
+              </p:ext>
+            </p:extLst>
+          </p:nvPr>
+        </p:nvSpPr>
+        <p:spPr>
+          <a:xfrm>
+            <a:off x="446534" y="3085764"/>
+            <a:ext cx="11298932" cy="3338149"/>
+          </a:xfrm>
+          <a:prstGeom prst="rect">
+            <a:avLst/>
+          </a:prstGeom>
+          <a:solidFill>
+            <a:srgbClr val="465359"/>
+          </a:solidFill>
+          <a:ln>
+            <a:noFill/>
+          </a:ln>
+          <a:effectLst/>
+        </p:spPr>
+        <p:style>
+          <a:lnRef idx="1">
+            <a:schemeClr val="accent1"/>
+          </a:lnRef>
+          <a:fillRef idx="3">
+            <a:schemeClr val="accent1"/>
+          </a:fillRef>
+          <a:effectRef idx="2">
+            <a:schemeClr val="accent1"/>
+          </a:effectRef>
+          <a:fontRef idx="minor">
+            <a:schemeClr val="lt1"/>
+          </a:fontRef>
+        </p:style>
+        <p:txBody>
+          <a:bodyPr/>
+          <a:lstStyle/>
+          <a:p>
+            <a:endParaRPr lang="en-GB"/>
+          </a:p>
+        </p:txBody>
+      </p:sp>
+      <p:sp>
+        <p:nvSpPr>
+          <p:cNvPr id="16" name="Rectangle 15">
+            <a:extLst>
+              <a:ext uri="{FF2B5EF4-FFF2-40B4-BE49-F238E27FC236}">
+                <a16:creationId xmlns:a16="http://schemas.microsoft.com/office/drawing/2014/main" id="{8E019540-1104-4B12-9F83-45F58674186F}"/>
+              </a:ext>
+              <a:ext uri="{C183D7F6-B498-43B3-948B-1728B52AA6E4}">
+                <adec:decorative xmlns:adec="http://schemas.microsoft.com/office/drawing/2017/decorative" val="1"/>
+              </a:ext>
+            </a:extLst>
+          </p:cNvPr>
+          <p:cNvSpPr>
+            <a:spLocks noGrp="1" noRot="1" noChangeAspect="1" noMove="1" noResize="1" noEditPoints="1" noAdjustHandles="1" noChangeArrowheads="1" noChangeShapeType="1" noTextEdit="1"/>
+          </p:cNvSpPr>
+          <p:nvPr>
+            <p:extLst>
+              <p:ext uri="{386F3935-93C4-4BCD-93E2-E3B085C9AB24}">
+                <p16:designElem xmlns:p16="http://schemas.microsoft.com/office/powerpoint/2015/main" val="1"/>
+              </p:ext>
+            </p:extLst>
+          </p:nvPr>
+        </p:nvSpPr>
+        <p:spPr>
+          <a:xfrm>
+            <a:off x="0" y="0"/>
+            <a:ext cx="12192000" cy="6858000"/>
+          </a:xfrm>
+          <a:prstGeom prst="rect">
+            <a:avLst/>
+          </a:prstGeom>
+          <a:solidFill>
+            <a:srgbClr val="3C474C"/>
+          </a:solidFill>
+          <a:ln>
+            <a:noFill/>
+          </a:ln>
+        </p:spPr>
+        <p:style>
+          <a:lnRef idx="2">
+            <a:schemeClr val="accent1">
+              <a:shade val="50000"/>
+            </a:schemeClr>
+          </a:lnRef>
+          <a:fillRef idx="1">
+            <a:schemeClr val="accent1"/>
+          </a:fillRef>
+          <a:effectRef idx="0">
+            <a:schemeClr val="accent1"/>
+          </a:effectRef>
+          <a:fontRef idx="minor">
+            <a:schemeClr val="lt1"/>
+          </a:fontRef>
+        </p:style>
+        <p:txBody>
+          <a:bodyPr rtlCol="0" anchor="ctr"/>
+          <a:lstStyle/>
+          <a:p>
+            <a:pPr algn="ctr"/>
+            <a:endParaRPr lang="en-US"/>
+          </a:p>
+        </p:txBody>
+      </p:sp>
+      <p:sp>
+        <p:nvSpPr>
           <p:cNvPr id="2" name="Title 1">
             <a:extLst>
               <a:ext uri="{FF2B5EF4-FFF2-40B4-BE49-F238E27FC236}">
-                <a16:creationId xmlns:a16="http://schemas.microsoft.com/office/drawing/2014/main" id="{DB0080DE-1461-27E8-9F6F-B760B2EFA1BE}"/>
+                <a16:creationId xmlns:a16="http://schemas.microsoft.com/office/drawing/2014/main" id="{C810655B-E882-5BD5-5F35-C893A8E30D60}"/>
               </a:ext>
             </a:extLst>
           </p:cNvPr>
@@ -5010,35 +8398,127 @@
             <p:ph type="title"/>
           </p:nvPr>
         </p:nvSpPr>
-        <p:spPr/>
-        <p:txBody>
-          <a:bodyPr/>
-          <a:lstStyle/>
-          <a:p>
-            <a:r>
-              <a:rPr lang="en-GB" dirty="0"/>
-              <a:t>Analysis</a:t>
-            </a:r>
-          </a:p>
-        </p:txBody>
-      </p:sp>
-      <p:sp>
-        <p:nvSpPr>
-          <p:cNvPr id="3" name="Content Placeholder 2">
-            <a:extLst>
-              <a:ext uri="{FF2B5EF4-FFF2-40B4-BE49-F238E27FC236}">
-                <a16:creationId xmlns:a16="http://schemas.microsoft.com/office/drawing/2014/main" id="{A73B3A22-2419-9F95-B937-73E28C51DBCA}"/>
-              </a:ext>
-            </a:extLst>
-          </p:cNvPr>
-          <p:cNvSpPr>
-            <a:spLocks noGrp="1"/>
-          </p:cNvSpPr>
-          <p:nvPr>
-            <p:ph idx="1"/>
-          </p:nvPr>
-        </p:nvSpPr>
-        <p:spPr/>
+        <p:spPr>
+          <a:xfrm>
+            <a:off x="783771" y="1066800"/>
+            <a:ext cx="5727760" cy="4724400"/>
+          </a:xfrm>
+        </p:spPr>
+        <p:txBody>
+          <a:bodyPr vert="horz" lIns="91440" tIns="45720" rIns="91440" bIns="45720" rtlCol="0" anchor="ctr">
+            <a:normAutofit/>
+          </a:bodyPr>
+          <a:lstStyle/>
+          <a:p>
+            <a:pPr algn="r"/>
+            <a:r>
+              <a:rPr lang="en-US" sz="6600" b="0" kern="1200" cap="all">
+                <a:solidFill>
+                  <a:srgbClr val="FFFFFF">
+                    <a:alpha val="90000"/>
+                  </a:srgbClr>
+                </a:solidFill>
+                <a:latin typeface="+mj-lt"/>
+                <a:ea typeface="+mj-ea"/>
+                <a:cs typeface="+mj-cs"/>
+              </a:rPr>
+              <a:t>MEthods</a:t>
+            </a:r>
+          </a:p>
+        </p:txBody>
+      </p:sp>
+      <p:sp>
+        <p:nvSpPr>
+          <p:cNvPr id="3" name="Text Placeholder 2">
+            <a:extLst>
+              <a:ext uri="{FF2B5EF4-FFF2-40B4-BE49-F238E27FC236}">
+                <a16:creationId xmlns:a16="http://schemas.microsoft.com/office/drawing/2014/main" id="{239479CB-95B3-DE42-1B93-E34055A0D845}"/>
+              </a:ext>
+            </a:extLst>
+          </p:cNvPr>
+          <p:cNvSpPr>
+            <a:spLocks noGrp="1"/>
+          </p:cNvSpPr>
+          <p:nvPr>
+            <p:ph type="body" idx="1"/>
+          </p:nvPr>
+        </p:nvSpPr>
+        <p:spPr>
+          <a:xfrm>
+            <a:off x="7534655" y="1066800"/>
+            <a:ext cx="3405015" cy="4724400"/>
+          </a:xfrm>
+          <a:ln w="57150">
+            <a:noFill/>
+          </a:ln>
+        </p:spPr>
+        <p:txBody>
+          <a:bodyPr vert="horz" lIns="91440" tIns="45720" rIns="91440" bIns="45720" rtlCol="0" anchor="ctr">
+            <a:normAutofit/>
+          </a:bodyPr>
+          <a:lstStyle/>
+          <a:p>
+            <a:endParaRPr lang="en-US" sz="2800">
+              <a:solidFill>
+                <a:srgbClr val="FFFFFF"/>
+              </a:solidFill>
+            </a:endParaRPr>
+          </a:p>
+        </p:txBody>
+      </p:sp>
+      <p:sp>
+        <p:nvSpPr>
+          <p:cNvPr id="18" name="Rectangle 17">
+            <a:extLst>
+              <a:ext uri="{FF2B5EF4-FFF2-40B4-BE49-F238E27FC236}">
+                <a16:creationId xmlns:a16="http://schemas.microsoft.com/office/drawing/2014/main" id="{3580CFD6-E44A-486A-9E73-D8D948F78A34}"/>
+              </a:ext>
+              <a:ext uri="{C183D7F6-B498-43B3-948B-1728B52AA6E4}">
+                <adec:decorative xmlns:adec="http://schemas.microsoft.com/office/drawing/2017/decorative" val="1"/>
+              </a:ext>
+            </a:extLst>
+          </p:cNvPr>
+          <p:cNvSpPr>
+            <a:spLocks noGrp="1" noRot="1" noChangeAspect="1" noMove="1" noResize="1" noEditPoints="1" noAdjustHandles="1" noChangeArrowheads="1" noChangeShapeType="1" noTextEdit="1"/>
+          </p:cNvSpPr>
+          <p:nvPr>
+            <p:extLst>
+              <p:ext uri="{386F3935-93C4-4BCD-93E2-E3B085C9AB24}">
+                <p16:designElem xmlns:p16="http://schemas.microsoft.com/office/powerpoint/2015/main" val="1"/>
+              </p:ext>
+            </p:extLst>
+          </p:nvPr>
+        </p:nvSpPr>
+        <p:spPr>
+          <a:xfrm rot="16200000">
+            <a:off x="5171433" y="3396996"/>
+            <a:ext cx="3703320" cy="64008"/>
+          </a:xfrm>
+          <a:prstGeom prst="rect">
+            <a:avLst/>
+          </a:prstGeom>
+          <a:solidFill>
+            <a:schemeClr val="accent1"/>
+          </a:solidFill>
+          <a:ln>
+            <a:noFill/>
+          </a:ln>
+          <a:effectLst/>
+        </p:spPr>
+        <p:style>
+          <a:lnRef idx="1">
+            <a:schemeClr val="accent1"/>
+          </a:lnRef>
+          <a:fillRef idx="3">
+            <a:schemeClr val="accent1"/>
+          </a:fillRef>
+          <a:effectRef idx="2">
+            <a:schemeClr val="accent1"/>
+          </a:effectRef>
+          <a:fontRef idx="minor">
+            <a:schemeClr val="lt1"/>
+          </a:fontRef>
+        </p:style>
         <p:txBody>
           <a:bodyPr/>
           <a:lstStyle/>
@@ -5050,12 +8530,12 @@
     </p:spTree>
     <p:extLst>
       <p:ext uri="{BB962C8B-B14F-4D97-AF65-F5344CB8AC3E}">
-        <p14:creationId xmlns:p14="http://schemas.microsoft.com/office/powerpoint/2010/main" val="2494100945"/>
+        <p14:creationId xmlns:p14="http://schemas.microsoft.com/office/powerpoint/2010/main" val="3453016319"/>
       </p:ext>
     </p:extLst>
   </p:cSld>
   <p:clrMapOvr>
-    <a:masterClrMapping/>
+    <a:overrideClrMapping bg1="dk1" tx1="lt1" bg2="dk2" tx2="lt2" accent1="accent1" accent2="accent2" accent3="accent3" accent4="accent4" accent5="accent5" accent6="accent6" hlink="hlink" folHlink="folHlink"/>
   </p:clrMapOvr>
 </p:sld>
 </file>
@@ -5082,7 +8562,7 @@
           <p:cNvPr id="2" name="Title 1">
             <a:extLst>
               <a:ext uri="{FF2B5EF4-FFF2-40B4-BE49-F238E27FC236}">
-                <a16:creationId xmlns:a16="http://schemas.microsoft.com/office/drawing/2014/main" id="{DC91E690-8E28-FFBC-7F47-AD6B3CBB3EB9}"/>
+                <a16:creationId xmlns:a16="http://schemas.microsoft.com/office/drawing/2014/main" id="{96C6BA18-BBBF-E711-2A09-3C12E0EF2163}"/>
               </a:ext>
             </a:extLst>
           </p:cNvPr>
@@ -5100,7 +8580,7 @@
           <a:p>
             <a:r>
               <a:rPr lang="en-GB" dirty="0"/>
-              <a:t>Conclusion</a:t>
+              <a:t>Methods</a:t>
             </a:r>
           </a:p>
         </p:txBody>
@@ -5110,7 +8590,7 @@
           <p:cNvPr id="3" name="Content Placeholder 2">
             <a:extLst>
               <a:ext uri="{FF2B5EF4-FFF2-40B4-BE49-F238E27FC236}">
-                <a16:creationId xmlns:a16="http://schemas.microsoft.com/office/drawing/2014/main" id="{C0D506B2-6FEA-AB53-D3C3-A753EC2C2FC9}"/>
+                <a16:creationId xmlns:a16="http://schemas.microsoft.com/office/drawing/2014/main" id="{4AB8A034-E906-0B5B-FD79-61F7AA3D5412}"/>
               </a:ext>
             </a:extLst>
           </p:cNvPr>
@@ -5123,17 +8603,179 @@
         </p:nvSpPr>
         <p:spPr/>
         <p:txBody>
-          <a:bodyPr/>
-          <a:lstStyle/>
-          <a:p>
-            <a:endParaRPr lang="en-GB"/>
+          <a:bodyPr>
+            <a:normAutofit lnSpcReduction="10000"/>
+          </a:bodyPr>
+          <a:lstStyle/>
+          <a:p>
+            <a:pPr marL="0" indent="0">
+              <a:buNone/>
+            </a:pPr>
+            <a:r>
+              <a:rPr lang="en-GB" sz="2800" dirty="0"/>
+              <a:t>1) Binary image classification task</a:t>
+            </a:r>
+          </a:p>
+          <a:p>
+            <a:pPr lvl="1"/>
+            <a:r>
+              <a:rPr lang="en-GB" sz="2400" dirty="0"/>
+              <a:t>A. Performance on CIFAKE, task difficulty</a:t>
+            </a:r>
+          </a:p>
+          <a:p>
+            <a:pPr lvl="1"/>
+            <a:r>
+              <a:rPr lang="en-GB" sz="2400" dirty="0"/>
+              <a:t>B. Suitability of channel attention: SRM</a:t>
+            </a:r>
+          </a:p>
+          <a:p>
+            <a:pPr lvl="1"/>
+            <a:endParaRPr lang="en-GB" sz="2400" dirty="0"/>
+          </a:p>
+          <a:p>
+            <a:pPr marL="0" indent="0">
+              <a:buNone/>
+            </a:pPr>
+            <a:r>
+              <a:rPr lang="en-GB" sz="2800" dirty="0"/>
+              <a:t>2) Transfer: applicability</a:t>
+            </a:r>
+          </a:p>
+          <a:p>
+            <a:pPr lvl="1"/>
+            <a:r>
+              <a:rPr lang="en-GB" sz="2400" dirty="0"/>
+              <a:t>A. on real images (similar style; cifar100)</a:t>
+            </a:r>
+          </a:p>
+          <a:p>
+            <a:pPr lvl="1"/>
+            <a:r>
+              <a:rPr lang="en-GB" sz="2400" dirty="0"/>
+              <a:t>B. on fake images (TBD)</a:t>
+            </a:r>
           </a:p>
         </p:txBody>
       </p:sp>
     </p:spTree>
     <p:extLst>
       <p:ext uri="{BB962C8B-B14F-4D97-AF65-F5344CB8AC3E}">
-        <p14:creationId xmlns:p14="http://schemas.microsoft.com/office/powerpoint/2010/main" val="2128849783"/>
+        <p14:creationId xmlns:p14="http://schemas.microsoft.com/office/powerpoint/2010/main" val="238722884"/>
+      </p:ext>
+    </p:extLst>
+  </p:cSld>
+  <p:clrMapOvr>
+    <a:masterClrMapping/>
+  </p:clrMapOvr>
+</p:sld>
+</file>
+
+<file path=ppt/slides/slide9.xml><?xml version="1.0" encoding="utf-8"?>
+<p:sld xmlns:a="http://schemas.openxmlformats.org/drawingml/2006/main" xmlns:r="http://schemas.openxmlformats.org/officeDocument/2006/relationships" xmlns:p="http://schemas.openxmlformats.org/presentationml/2006/main">
+  <p:cSld>
+    <p:spTree>
+      <p:nvGrpSpPr>
+        <p:cNvPr id="1" name="">
+          <a:extLst>
+            <a:ext uri="{FF2B5EF4-FFF2-40B4-BE49-F238E27FC236}">
+              <a16:creationId xmlns:a16="http://schemas.microsoft.com/office/drawing/2014/main" id="{97562D1C-A848-4BFC-F5F8-5AA67B991ECB}"/>
+            </a:ext>
+          </a:extLst>
+        </p:cNvPr>
+        <p:cNvGrpSpPr/>
+        <p:nvPr/>
+      </p:nvGrpSpPr>
+      <p:grpSpPr>
+        <a:xfrm>
+          <a:off x="0" y="0"/>
+          <a:ext cx="0" cy="0"/>
+          <a:chOff x="0" y="0"/>
+          <a:chExt cx="0" cy="0"/>
+        </a:xfrm>
+      </p:grpSpPr>
+      <p:sp>
+        <p:nvSpPr>
+          <p:cNvPr id="2" name="Title 1">
+            <a:extLst>
+              <a:ext uri="{FF2B5EF4-FFF2-40B4-BE49-F238E27FC236}">
+                <a16:creationId xmlns:a16="http://schemas.microsoft.com/office/drawing/2014/main" id="{702D071E-75F8-9275-612A-D2E58A24A958}"/>
+              </a:ext>
+            </a:extLst>
+          </p:cNvPr>
+          <p:cNvSpPr>
+            <a:spLocks noGrp="1"/>
+          </p:cNvSpPr>
+          <p:nvPr>
+            <p:ph type="title"/>
+          </p:nvPr>
+        </p:nvSpPr>
+        <p:spPr/>
+        <p:txBody>
+          <a:bodyPr/>
+          <a:lstStyle/>
+          <a:p>
+            <a:r>
+              <a:rPr lang="en-GB" dirty="0"/>
+              <a:t>Methods</a:t>
+            </a:r>
+            <a:br>
+              <a:rPr lang="en-GB" dirty="0"/>
+            </a:br>
+            <a:r>
+              <a:rPr lang="en-GB" sz="2800" b="1" dirty="0"/>
+              <a:t>1) Binary Image classification</a:t>
+            </a:r>
+            <a:endParaRPr lang="en-GB" b="1" dirty="0"/>
+          </a:p>
+        </p:txBody>
+      </p:sp>
+      <p:sp>
+        <p:nvSpPr>
+          <p:cNvPr id="3" name="Content Placeholder 2">
+            <a:extLst>
+              <a:ext uri="{FF2B5EF4-FFF2-40B4-BE49-F238E27FC236}">
+                <a16:creationId xmlns:a16="http://schemas.microsoft.com/office/drawing/2014/main" id="{96F04D08-DC50-A0CC-2153-C1FFB0E0AB87}"/>
+              </a:ext>
+            </a:extLst>
+          </p:cNvPr>
+          <p:cNvSpPr>
+            <a:spLocks noGrp="1"/>
+          </p:cNvSpPr>
+          <p:nvPr>
+            <p:ph idx="1"/>
+          </p:nvPr>
+        </p:nvSpPr>
+        <p:spPr/>
+        <p:txBody>
+          <a:bodyPr anchor="t">
+            <a:normAutofit/>
+          </a:bodyPr>
+          <a:lstStyle/>
+          <a:p>
+            <a:pPr marL="514350" indent="-514350">
+              <a:buFont typeface="+mj-lt"/>
+              <a:buAutoNum type="alphaUcPeriod"/>
+            </a:pPr>
+            <a:r>
+              <a:rPr lang="en-GB" sz="2800" dirty="0"/>
+              <a:t>Performance on CIFAKE, task difficulty</a:t>
+            </a:r>
+          </a:p>
+          <a:p>
+            <a:pPr lvl="1"/>
+            <a:r>
+              <a:rPr lang="en-GB" sz="2400" dirty="0"/>
+              <a:t>Train CNN based on cifar10_tutorial.ipynb (modified for binary classification)</a:t>
+            </a:r>
+          </a:p>
+        </p:txBody>
+      </p:sp>
+    </p:spTree>
+    <p:extLst>
+      <p:ext uri="{BB962C8B-B14F-4D97-AF65-F5344CB8AC3E}">
+        <p14:creationId xmlns:p14="http://schemas.microsoft.com/office/powerpoint/2010/main" val="2801581498"/>
       </p:ext>
     </p:extLst>
   </p:cSld>
@@ -5410,4 +9052,319 @@
     </a:ext>
   </a:extLst>
 </a:theme>
+</file>
+
+<file path=ppt/theme/theme2.xml><?xml version="1.0" encoding="utf-8"?>
+<a:theme xmlns:a="http://schemas.openxmlformats.org/drawingml/2006/main" name="Office Theme">
+  <a:themeElements>
+    <a:clrScheme name="Office">
+      <a:dk1>
+        <a:sysClr val="windowText" lastClr="000000"/>
+      </a:dk1>
+      <a:lt1>
+        <a:sysClr val="window" lastClr="FFFFFF"/>
+      </a:lt1>
+      <a:dk2>
+        <a:srgbClr val="0E2841"/>
+      </a:dk2>
+      <a:lt2>
+        <a:srgbClr val="E8E8E8"/>
+      </a:lt2>
+      <a:accent1>
+        <a:srgbClr val="156082"/>
+      </a:accent1>
+      <a:accent2>
+        <a:srgbClr val="E97132"/>
+      </a:accent2>
+      <a:accent3>
+        <a:srgbClr val="196B24"/>
+      </a:accent3>
+      <a:accent4>
+        <a:srgbClr val="0F9ED5"/>
+      </a:accent4>
+      <a:accent5>
+        <a:srgbClr val="A02B93"/>
+      </a:accent5>
+      <a:accent6>
+        <a:srgbClr val="4EA72E"/>
+      </a:accent6>
+      <a:hlink>
+        <a:srgbClr val="467886"/>
+      </a:hlink>
+      <a:folHlink>
+        <a:srgbClr val="96607D"/>
+      </a:folHlink>
+    </a:clrScheme>
+    <a:fontScheme name="Office">
+      <a:majorFont>
+        <a:latin typeface="Aptos Display" panose="02110004020202020204"/>
+        <a:ea typeface=""/>
+        <a:cs typeface=""/>
+        <a:font script="Jpan" typeface="游ゴシック Light"/>
+        <a:font script="Hang" typeface="맑은 고딕"/>
+        <a:font script="Hans" typeface="等线 Light"/>
+        <a:font script="Hant" typeface="新細明體"/>
+        <a:font script="Arab" typeface="Times New Roman"/>
+        <a:font script="Hebr" typeface="Times New Roman"/>
+        <a:font script="Thai" typeface="Angsana New"/>
+        <a:font script="Ethi" typeface="Nyala"/>
+        <a:font script="Beng" typeface="Vrinda"/>
+        <a:font script="Gujr" typeface="Shruti"/>
+        <a:font script="Khmr" typeface="MoolBoran"/>
+        <a:font script="Knda" typeface="Tunga"/>
+        <a:font script="Guru" typeface="Raavi"/>
+        <a:font script="Cans" typeface="Euphemia"/>
+        <a:font script="Cher" typeface="Plantagenet Cherokee"/>
+        <a:font script="Yiii" typeface="Microsoft Yi Baiti"/>
+        <a:font script="Tibt" typeface="Microsoft Himalaya"/>
+        <a:font script="Thaa" typeface="MV Boli"/>
+        <a:font script="Deva" typeface="Mangal"/>
+        <a:font script="Telu" typeface="Gautami"/>
+        <a:font script="Taml" typeface="Latha"/>
+        <a:font script="Syrc" typeface="Estrangelo Edessa"/>
+        <a:font script="Orya" typeface="Kalinga"/>
+        <a:font script="Mlym" typeface="Kartika"/>
+        <a:font script="Laoo" typeface="DokChampa"/>
+        <a:font script="Sinh" typeface="Iskoola Pota"/>
+        <a:font script="Mong" typeface="Mongolian Baiti"/>
+        <a:font script="Viet" typeface="Times New Roman"/>
+        <a:font script="Uigh" typeface="Microsoft Uighur"/>
+        <a:font script="Geor" typeface="Sylfaen"/>
+        <a:font script="Armn" typeface="Arial"/>
+        <a:font script="Bugi" typeface="Leelawadee UI"/>
+        <a:font script="Bopo" typeface="Microsoft JhengHei"/>
+        <a:font script="Java" typeface="Javanese Text"/>
+        <a:font script="Lisu" typeface="Segoe UI"/>
+        <a:font script="Mymr" typeface="Myanmar Text"/>
+        <a:font script="Nkoo" typeface="Ebrima"/>
+        <a:font script="Olck" typeface="Nirmala UI"/>
+        <a:font script="Osma" typeface="Ebrima"/>
+        <a:font script="Phag" typeface="Phagspa"/>
+        <a:font script="Syrn" typeface="Estrangelo Edessa"/>
+        <a:font script="Syrj" typeface="Estrangelo Edessa"/>
+        <a:font script="Syre" typeface="Estrangelo Edessa"/>
+        <a:font script="Sora" typeface="Nirmala UI"/>
+        <a:font script="Tale" typeface="Microsoft Tai Le"/>
+        <a:font script="Talu" typeface="Microsoft New Tai Lue"/>
+        <a:font script="Tfng" typeface="Ebrima"/>
+      </a:majorFont>
+      <a:minorFont>
+        <a:latin typeface="Aptos" panose="02110004020202020204"/>
+        <a:ea typeface=""/>
+        <a:cs typeface=""/>
+        <a:font script="Jpan" typeface="游ゴシック"/>
+        <a:font script="Hang" typeface="맑은 고딕"/>
+        <a:font script="Hans" typeface="等线"/>
+        <a:font script="Hant" typeface="新細明體"/>
+        <a:font script="Arab" typeface="Arial"/>
+        <a:font script="Hebr" typeface="Arial"/>
+        <a:font script="Thai" typeface="Cordia New"/>
+        <a:font script="Ethi" typeface="Nyala"/>
+        <a:font script="Beng" typeface="Vrinda"/>
+        <a:font script="Gujr" typeface="Shruti"/>
+        <a:font script="Khmr" typeface="DaunPenh"/>
+        <a:font script="Knda" typeface="Tunga"/>
+        <a:font script="Guru" typeface="Raavi"/>
+        <a:font script="Cans" typeface="Euphemia"/>
+        <a:font script="Cher" typeface="Plantagenet Cherokee"/>
+        <a:font script="Yiii" typeface="Microsoft Yi Baiti"/>
+        <a:font script="Tibt" typeface="Microsoft Himalaya"/>
+        <a:font script="Thaa" typeface="MV Boli"/>
+        <a:font script="Deva" typeface="Mangal"/>
+        <a:font script="Telu" typeface="Gautami"/>
+        <a:font script="Taml" typeface="Latha"/>
+        <a:font script="Syrc" typeface="Estrangelo Edessa"/>
+        <a:font script="Orya" typeface="Kalinga"/>
+        <a:font script="Mlym" typeface="Kartika"/>
+        <a:font script="Laoo" typeface="DokChampa"/>
+        <a:font script="Sinh" typeface="Iskoola Pota"/>
+        <a:font script="Mong" typeface="Mongolian Baiti"/>
+        <a:font script="Viet" typeface="Arial"/>
+        <a:font script="Uigh" typeface="Microsoft Uighur"/>
+        <a:font script="Geor" typeface="Sylfaen"/>
+        <a:font script="Armn" typeface="Arial"/>
+        <a:font script="Bugi" typeface="Leelawadee UI"/>
+        <a:font script="Bopo" typeface="Microsoft JhengHei"/>
+        <a:font script="Java" typeface="Javanese Text"/>
+        <a:font script="Lisu" typeface="Segoe UI"/>
+        <a:font script="Mymr" typeface="Myanmar Text"/>
+        <a:font script="Nkoo" typeface="Ebrima"/>
+        <a:font script="Olck" typeface="Nirmala UI"/>
+        <a:font script="Osma" typeface="Ebrima"/>
+        <a:font script="Phag" typeface="Phagspa"/>
+        <a:font script="Syrn" typeface="Estrangelo Edessa"/>
+        <a:font script="Syrj" typeface="Estrangelo Edessa"/>
+        <a:font script="Syre" typeface="Estrangelo Edessa"/>
+        <a:font script="Sora" typeface="Nirmala UI"/>
+        <a:font script="Tale" typeface="Microsoft Tai Le"/>
+        <a:font script="Talu" typeface="Microsoft New Tai Lue"/>
+        <a:font script="Tfng" typeface="Ebrima"/>
+      </a:minorFont>
+    </a:fontScheme>
+    <a:fmtScheme name="Office">
+      <a:fillStyleLst>
+        <a:solidFill>
+          <a:schemeClr val="phClr"/>
+        </a:solidFill>
+        <a:gradFill rotWithShape="1">
+          <a:gsLst>
+            <a:gs pos="0">
+              <a:schemeClr val="phClr">
+                <a:lumMod val="110000"/>
+                <a:satMod val="105000"/>
+                <a:tint val="67000"/>
+              </a:schemeClr>
+            </a:gs>
+            <a:gs pos="50000">
+              <a:schemeClr val="phClr">
+                <a:lumMod val="105000"/>
+                <a:satMod val="103000"/>
+                <a:tint val="73000"/>
+              </a:schemeClr>
+            </a:gs>
+            <a:gs pos="100000">
+              <a:schemeClr val="phClr">
+                <a:lumMod val="105000"/>
+                <a:satMod val="109000"/>
+                <a:tint val="81000"/>
+              </a:schemeClr>
+            </a:gs>
+          </a:gsLst>
+          <a:lin ang="5400000" scaled="0"/>
+        </a:gradFill>
+        <a:gradFill rotWithShape="1">
+          <a:gsLst>
+            <a:gs pos="0">
+              <a:schemeClr val="phClr">
+                <a:satMod val="103000"/>
+                <a:lumMod val="102000"/>
+                <a:tint val="94000"/>
+              </a:schemeClr>
+            </a:gs>
+            <a:gs pos="50000">
+              <a:schemeClr val="phClr">
+                <a:satMod val="110000"/>
+                <a:lumMod val="100000"/>
+                <a:shade val="100000"/>
+              </a:schemeClr>
+            </a:gs>
+            <a:gs pos="100000">
+              <a:schemeClr val="phClr">
+                <a:lumMod val="99000"/>
+                <a:satMod val="120000"/>
+                <a:shade val="78000"/>
+              </a:schemeClr>
+            </a:gs>
+          </a:gsLst>
+          <a:lin ang="5400000" scaled="0"/>
+        </a:gradFill>
+      </a:fillStyleLst>
+      <a:lnStyleLst>
+        <a:ln w="12700" cap="flat" cmpd="sng" algn="ctr">
+          <a:solidFill>
+            <a:schemeClr val="phClr"/>
+          </a:solidFill>
+          <a:prstDash val="solid"/>
+          <a:miter lim="800000"/>
+        </a:ln>
+        <a:ln w="19050" cap="flat" cmpd="sng" algn="ctr">
+          <a:solidFill>
+            <a:schemeClr val="phClr"/>
+          </a:solidFill>
+          <a:prstDash val="solid"/>
+          <a:miter lim="800000"/>
+        </a:ln>
+        <a:ln w="25400" cap="flat" cmpd="sng" algn="ctr">
+          <a:solidFill>
+            <a:schemeClr val="phClr"/>
+          </a:solidFill>
+          <a:prstDash val="solid"/>
+          <a:miter lim="800000"/>
+        </a:ln>
+      </a:lnStyleLst>
+      <a:effectStyleLst>
+        <a:effectStyle>
+          <a:effectLst/>
+        </a:effectStyle>
+        <a:effectStyle>
+          <a:effectLst/>
+        </a:effectStyle>
+        <a:effectStyle>
+          <a:effectLst>
+            <a:outerShdw blurRad="57150" dist="19050" dir="5400000" algn="ctr" rotWithShape="0">
+              <a:srgbClr val="000000">
+                <a:alpha val="63000"/>
+              </a:srgbClr>
+            </a:outerShdw>
+          </a:effectLst>
+        </a:effectStyle>
+      </a:effectStyleLst>
+      <a:bgFillStyleLst>
+        <a:solidFill>
+          <a:schemeClr val="phClr"/>
+        </a:solidFill>
+        <a:solidFill>
+          <a:schemeClr val="phClr">
+            <a:tint val="95000"/>
+            <a:satMod val="170000"/>
+          </a:schemeClr>
+        </a:solidFill>
+        <a:gradFill rotWithShape="1">
+          <a:gsLst>
+            <a:gs pos="0">
+              <a:schemeClr val="phClr">
+                <a:tint val="93000"/>
+                <a:satMod val="150000"/>
+                <a:shade val="98000"/>
+                <a:lumMod val="102000"/>
+              </a:schemeClr>
+            </a:gs>
+            <a:gs pos="50000">
+              <a:schemeClr val="phClr">
+                <a:tint val="98000"/>
+                <a:satMod val="130000"/>
+                <a:shade val="90000"/>
+                <a:lumMod val="103000"/>
+              </a:schemeClr>
+            </a:gs>
+            <a:gs pos="100000">
+              <a:schemeClr val="phClr">
+                <a:shade val="63000"/>
+                <a:satMod val="120000"/>
+              </a:schemeClr>
+            </a:gs>
+          </a:gsLst>
+          <a:lin ang="5400000" scaled="0"/>
+        </a:gradFill>
+      </a:bgFillStyleLst>
+    </a:fmtScheme>
+  </a:themeElements>
+  <a:objectDefaults>
+    <a:lnDef>
+      <a:spPr/>
+      <a:bodyPr/>
+      <a:lstStyle/>
+      <a:style>
+        <a:lnRef idx="2">
+          <a:schemeClr val="accent1"/>
+        </a:lnRef>
+        <a:fillRef idx="0">
+          <a:schemeClr val="accent1"/>
+        </a:fillRef>
+        <a:effectRef idx="1">
+          <a:schemeClr val="accent1"/>
+        </a:effectRef>
+        <a:fontRef idx="minor">
+          <a:schemeClr val="tx1"/>
+        </a:fontRef>
+      </a:style>
+    </a:lnDef>
+  </a:objectDefaults>
+  <a:extraClrSchemeLst/>
+  <a:extLst>
+    <a:ext uri="{05A4C25C-085E-4340-85A3-A5531E510DB2}">
+      <thm15:themeFamily xmlns:thm15="http://schemas.microsoft.com/office/thememl/2012/main" name="Office Theme" id="{2E142A2C-CD16-42D6-873A-C26D2A0506FA}" vid="{1BDDFF52-6CD6-40A5-AB3C-68EB2F1E4D0A}"/>
+    </a:ext>
+  </a:extLst>
+</a:theme>
 </file>
</xml_diff>